<commit_message>
feat: adding chapter (árvore de decisão)
</commit_message>
<xml_diff>
--- a/adaboost.pptx
+++ b/adaboost.pptx
@@ -25,6 +25,7 @@
     <p:sldId id="265" r:id="rId19"/>
     <p:sldId id="266" r:id="rId20"/>
     <p:sldId id="278" r:id="rId21"/>
+    <p:sldId id="279" r:id="rId22"/>
   </p:sldIdLst>
   <p:sldSz cx="12192000" cy="6858000"/>
   <p:notesSz cx="6858000" cy="9144000"/>
@@ -278,7 +279,7 @@
           <a:p>
             <a:fld id="{D01C6006-A6AF-4E75-8B97-E9B7CBF50D3D}" type="datetimeFigureOut">
               <a:rPr lang="pt-BR" smtClean="0"/>
-              <a:t>21/06/2024</a:t>
+              <a:t>26/06/2024</a:t>
             </a:fld>
             <a:endParaRPr lang="pt-BR"/>
           </a:p>
@@ -476,7 +477,7 @@
           <a:p>
             <a:fld id="{D01C6006-A6AF-4E75-8B97-E9B7CBF50D3D}" type="datetimeFigureOut">
               <a:rPr lang="pt-BR" smtClean="0"/>
-              <a:t>21/06/2024</a:t>
+              <a:t>26/06/2024</a:t>
             </a:fld>
             <a:endParaRPr lang="pt-BR"/>
           </a:p>
@@ -684,7 +685,7 @@
           <a:p>
             <a:fld id="{D01C6006-A6AF-4E75-8B97-E9B7CBF50D3D}" type="datetimeFigureOut">
               <a:rPr lang="pt-BR" smtClean="0"/>
-              <a:t>21/06/2024</a:t>
+              <a:t>26/06/2024</a:t>
             </a:fld>
             <a:endParaRPr lang="pt-BR"/>
           </a:p>
@@ -882,7 +883,7 @@
           <a:p>
             <a:fld id="{D01C6006-A6AF-4E75-8B97-E9B7CBF50D3D}" type="datetimeFigureOut">
               <a:rPr lang="pt-BR" smtClean="0"/>
-              <a:t>21/06/2024</a:t>
+              <a:t>26/06/2024</a:t>
             </a:fld>
             <a:endParaRPr lang="pt-BR"/>
           </a:p>
@@ -1157,7 +1158,7 @@
           <a:p>
             <a:fld id="{D01C6006-A6AF-4E75-8B97-E9B7CBF50D3D}" type="datetimeFigureOut">
               <a:rPr lang="pt-BR" smtClean="0"/>
-              <a:t>21/06/2024</a:t>
+              <a:t>26/06/2024</a:t>
             </a:fld>
             <a:endParaRPr lang="pt-BR"/>
           </a:p>
@@ -1422,7 +1423,7 @@
           <a:p>
             <a:fld id="{D01C6006-A6AF-4E75-8B97-E9B7CBF50D3D}" type="datetimeFigureOut">
               <a:rPr lang="pt-BR" smtClean="0"/>
-              <a:t>21/06/2024</a:t>
+              <a:t>26/06/2024</a:t>
             </a:fld>
             <a:endParaRPr lang="pt-BR"/>
           </a:p>
@@ -1834,7 +1835,7 @@
           <a:p>
             <a:fld id="{D01C6006-A6AF-4E75-8B97-E9B7CBF50D3D}" type="datetimeFigureOut">
               <a:rPr lang="pt-BR" smtClean="0"/>
-              <a:t>21/06/2024</a:t>
+              <a:t>26/06/2024</a:t>
             </a:fld>
             <a:endParaRPr lang="pt-BR"/>
           </a:p>
@@ -1975,7 +1976,7 @@
           <a:p>
             <a:fld id="{D01C6006-A6AF-4E75-8B97-E9B7CBF50D3D}" type="datetimeFigureOut">
               <a:rPr lang="pt-BR" smtClean="0"/>
-              <a:t>21/06/2024</a:t>
+              <a:t>26/06/2024</a:t>
             </a:fld>
             <a:endParaRPr lang="pt-BR"/>
           </a:p>
@@ -2088,7 +2089,7 @@
           <a:p>
             <a:fld id="{D01C6006-A6AF-4E75-8B97-E9B7CBF50D3D}" type="datetimeFigureOut">
               <a:rPr lang="pt-BR" smtClean="0"/>
-              <a:t>21/06/2024</a:t>
+              <a:t>26/06/2024</a:t>
             </a:fld>
             <a:endParaRPr lang="pt-BR"/>
           </a:p>
@@ -2399,7 +2400,7 @@
           <a:p>
             <a:fld id="{D01C6006-A6AF-4E75-8B97-E9B7CBF50D3D}" type="datetimeFigureOut">
               <a:rPr lang="pt-BR" smtClean="0"/>
-              <a:t>21/06/2024</a:t>
+              <a:t>26/06/2024</a:t>
             </a:fld>
             <a:endParaRPr lang="pt-BR"/>
           </a:p>
@@ -2687,7 +2688,7 @@
           <a:p>
             <a:fld id="{D01C6006-A6AF-4E75-8B97-E9B7CBF50D3D}" type="datetimeFigureOut">
               <a:rPr lang="pt-BR" smtClean="0"/>
-              <a:t>21/06/2024</a:t>
+              <a:t>26/06/2024</a:t>
             </a:fld>
             <a:endParaRPr lang="pt-BR"/>
           </a:p>
@@ -2928,7 +2929,7 @@
           <a:p>
             <a:fld id="{D01C6006-A6AF-4E75-8B97-E9B7CBF50D3D}" type="datetimeFigureOut">
               <a:rPr lang="pt-BR" smtClean="0"/>
-              <a:t>21/06/2024</a:t>
+              <a:t>26/06/2024</a:t>
             </a:fld>
             <a:endParaRPr lang="pt-BR"/>
           </a:p>
@@ -33066,8 +33067,8 @@
           </a:p>
         </p:txBody>
       </p:sp>
-      <mc:AlternateContent xmlns:mc="http://schemas.openxmlformats.org/markup-compatibility/2006">
-        <mc:Choice xmlns:a14="http://schemas.microsoft.com/office/drawing/2010/main" Requires="a14">
+      <mc:AlternateContent xmlns:mc="http://schemas.openxmlformats.org/markup-compatibility/2006" xmlns:a14="http://schemas.microsoft.com/office/drawing/2010/main">
+        <mc:Choice Requires="a14">
           <p:sp>
             <p:nvSpPr>
               <p:cNvPr id="7" name="CaixaDeTexto 6">
@@ -33096,6 +33097,7 @@
               </a:bodyPr>
               <a:lstStyle/>
               <a:p>
+                <a:pPr/>
                 <a14:m>
                   <m:oMathPara xmlns:m="http://schemas.openxmlformats.org/officeDocument/2006/math">
                     <m:oMathParaPr>
@@ -33116,7 +33118,7 @@
             </p:txBody>
           </p:sp>
         </mc:Choice>
-        <mc:Fallback>
+        <mc:Fallback xmlns="">
           <p:sp>
             <p:nvSpPr>
               <p:cNvPr id="7" name="CaixaDeTexto 6">
@@ -33429,8 +33431,8 @@
           </a:fontRef>
         </p:style>
       </p:cxnSp>
-      <mc:AlternateContent xmlns:mc="http://schemas.openxmlformats.org/markup-compatibility/2006">
-        <mc:Choice xmlns:a14="http://schemas.microsoft.com/office/drawing/2010/main" Requires="a14">
+      <mc:AlternateContent xmlns:mc="http://schemas.openxmlformats.org/markup-compatibility/2006" xmlns:a14="http://schemas.microsoft.com/office/drawing/2010/main">
+        <mc:Choice Requires="a14">
           <p:sp>
             <p:nvSpPr>
               <p:cNvPr id="32" name="Elipse 31">
@@ -33515,7 +33517,7 @@
             </p:txBody>
           </p:sp>
         </mc:Choice>
-        <mc:Fallback>
+        <mc:Fallback xmlns="">
           <p:sp>
             <p:nvSpPr>
               <p:cNvPr id="32" name="Elipse 31">
@@ -33955,8 +33957,8 @@
             </a:p>
           </p:txBody>
         </p:sp>
-        <mc:AlternateContent xmlns:mc="http://schemas.openxmlformats.org/markup-compatibility/2006">
-          <mc:Choice xmlns:a14="http://schemas.microsoft.com/office/drawing/2010/main" Requires="a14">
+        <mc:AlternateContent xmlns:mc="http://schemas.openxmlformats.org/markup-compatibility/2006" xmlns:a14="http://schemas.microsoft.com/office/drawing/2010/main">
+          <mc:Choice Requires="a14">
             <p:sp>
               <p:nvSpPr>
                 <p:cNvPr id="75" name="CaixaDeTexto 74">
@@ -33985,6 +33987,7 @@
                 </a:bodyPr>
                 <a:lstStyle/>
                 <a:p>
+                  <a:pPr/>
                   <a14:m>
                     <m:oMathPara xmlns:m="http://schemas.openxmlformats.org/officeDocument/2006/math">
                       <m:oMathParaPr>
@@ -34024,7 +34027,7 @@
               </p:txBody>
             </p:sp>
           </mc:Choice>
-          <mc:Fallback>
+          <mc:Fallback xmlns="">
             <p:sp>
               <p:nvSpPr>
                 <p:cNvPr id="75" name="CaixaDeTexto 74">
@@ -34146,8 +34149,8 @@
             </a:p>
           </p:txBody>
         </p:sp>
-        <mc:AlternateContent xmlns:mc="http://schemas.openxmlformats.org/markup-compatibility/2006">
-          <mc:Choice xmlns:a14="http://schemas.microsoft.com/office/drawing/2010/main" Requires="a14">
+        <mc:AlternateContent xmlns:mc="http://schemas.openxmlformats.org/markup-compatibility/2006" xmlns:a14="http://schemas.microsoft.com/office/drawing/2010/main">
+          <mc:Choice Requires="a14">
             <p:sp>
               <p:nvSpPr>
                 <p:cNvPr id="76" name="CaixaDeTexto 75">
@@ -34176,6 +34179,7 @@
                 </a:bodyPr>
                 <a:lstStyle/>
                 <a:p>
+                  <a:pPr/>
                   <a14:m>
                     <m:oMathPara xmlns:m="http://schemas.openxmlformats.org/officeDocument/2006/math">
                       <m:oMathParaPr>
@@ -34215,7 +34219,7 @@
               </p:txBody>
             </p:sp>
           </mc:Choice>
-          <mc:Fallback>
+          <mc:Fallback xmlns="">
             <p:sp>
               <p:nvSpPr>
                 <p:cNvPr id="76" name="CaixaDeTexto 75">
@@ -34335,8 +34339,8 @@
             </a:p>
           </p:txBody>
         </p:sp>
-        <mc:AlternateContent xmlns:mc="http://schemas.openxmlformats.org/markup-compatibility/2006">
-          <mc:Choice xmlns:a14="http://schemas.microsoft.com/office/drawing/2010/main" Requires="a14">
+        <mc:AlternateContent xmlns:mc="http://schemas.openxmlformats.org/markup-compatibility/2006" xmlns:a14="http://schemas.microsoft.com/office/drawing/2010/main">
+          <mc:Choice Requires="a14">
             <p:sp>
               <p:nvSpPr>
                 <p:cNvPr id="77" name="CaixaDeTexto 76">
@@ -34365,6 +34369,7 @@
                 </a:bodyPr>
                 <a:lstStyle/>
                 <a:p>
+                  <a:pPr/>
                   <a14:m>
                     <m:oMathPara xmlns:m="http://schemas.openxmlformats.org/officeDocument/2006/math">
                       <m:oMathParaPr>
@@ -34404,7 +34409,7 @@
               </p:txBody>
             </p:sp>
           </mc:Choice>
-          <mc:Fallback>
+          <mc:Fallback xmlns="">
             <p:sp>
               <p:nvSpPr>
                 <p:cNvPr id="77" name="CaixaDeTexto 76">
@@ -34495,8 +34500,8 @@
           </a:fontRef>
         </p:style>
       </p:cxnSp>
-      <mc:AlternateContent xmlns:mc="http://schemas.openxmlformats.org/markup-compatibility/2006">
-        <mc:Choice xmlns:a14="http://schemas.microsoft.com/office/drawing/2010/main" Requires="a14">
+      <mc:AlternateContent xmlns:mc="http://schemas.openxmlformats.org/markup-compatibility/2006" xmlns:a14="http://schemas.microsoft.com/office/drawing/2010/main">
+        <mc:Choice Requires="a14">
           <p:sp>
             <p:nvSpPr>
               <p:cNvPr id="91" name="CaixaDeTexto 90">
@@ -34525,6 +34530,7 @@
               </a:bodyPr>
               <a:lstStyle/>
               <a:p>
+                <a:pPr/>
                 <a14:m>
                   <m:oMathPara xmlns:m="http://schemas.openxmlformats.org/officeDocument/2006/math">
                     <m:oMathParaPr>
@@ -34562,7 +34568,7 @@
             </p:txBody>
           </p:sp>
         </mc:Choice>
-        <mc:Fallback>
+        <mc:Fallback xmlns="">
           <p:sp>
             <p:nvSpPr>
               <p:cNvPr id="91" name="CaixaDeTexto 90">
@@ -34607,8 +34613,8 @@
           </p:sp>
         </mc:Fallback>
       </mc:AlternateContent>
-      <mc:AlternateContent xmlns:mc="http://schemas.openxmlformats.org/markup-compatibility/2006">
-        <mc:Choice xmlns:a14="http://schemas.microsoft.com/office/drawing/2010/main" Requires="a14">
+      <mc:AlternateContent xmlns:mc="http://schemas.openxmlformats.org/markup-compatibility/2006" xmlns:a14="http://schemas.microsoft.com/office/drawing/2010/main">
+        <mc:Choice Requires="a14">
           <p:sp>
             <p:nvSpPr>
               <p:cNvPr id="101" name="CaixaDeTexto 100">
@@ -34637,6 +34643,7 @@
               </a:bodyPr>
               <a:lstStyle/>
               <a:p>
+                <a:pPr/>
                 <a14:m>
                   <m:oMathPara xmlns:m="http://schemas.openxmlformats.org/officeDocument/2006/math">
                     <m:oMathParaPr>
@@ -34755,7 +34762,7 @@
             </p:txBody>
           </p:sp>
         </mc:Choice>
-        <mc:Fallback>
+        <mc:Fallback xmlns="">
           <p:sp>
             <p:nvSpPr>
               <p:cNvPr id="101" name="CaixaDeTexto 100">
@@ -34800,8 +34807,8 @@
           </p:sp>
         </mc:Fallback>
       </mc:AlternateContent>
-      <mc:AlternateContent xmlns:mc="http://schemas.openxmlformats.org/markup-compatibility/2006">
-        <mc:Choice xmlns:a14="http://schemas.microsoft.com/office/drawing/2010/main" Requires="a14">
+      <mc:AlternateContent xmlns:mc="http://schemas.openxmlformats.org/markup-compatibility/2006" xmlns:a14="http://schemas.microsoft.com/office/drawing/2010/main">
+        <mc:Choice Requires="a14">
           <p:sp>
             <p:nvSpPr>
               <p:cNvPr id="102" name="CaixaDeTexto 101">
@@ -34830,6 +34837,7 @@
               </a:bodyPr>
               <a:lstStyle/>
               <a:p>
+                <a:pPr/>
                 <a14:m>
                   <m:oMathPara xmlns:m="http://schemas.openxmlformats.org/officeDocument/2006/math">
                     <m:oMathParaPr>
@@ -34968,7 +34976,7 @@
             </p:txBody>
           </p:sp>
         </mc:Choice>
-        <mc:Fallback>
+        <mc:Fallback xmlns="">
           <p:sp>
             <p:nvSpPr>
               <p:cNvPr id="102" name="CaixaDeTexto 101">
@@ -35013,8 +35021,8 @@
           </p:sp>
         </mc:Fallback>
       </mc:AlternateContent>
-      <mc:AlternateContent xmlns:mc="http://schemas.openxmlformats.org/markup-compatibility/2006">
-        <mc:Choice xmlns:a14="http://schemas.microsoft.com/office/drawing/2010/main" Requires="a14">
+      <mc:AlternateContent xmlns:mc="http://schemas.openxmlformats.org/markup-compatibility/2006" xmlns:a14="http://schemas.microsoft.com/office/drawing/2010/main">
+        <mc:Choice Requires="a14">
           <p:sp>
             <p:nvSpPr>
               <p:cNvPr id="105" name="CaixaDeTexto 104">
@@ -35043,6 +35051,7 @@
               </a:bodyPr>
               <a:lstStyle/>
               <a:p>
+                <a:pPr/>
                 <a14:m>
                   <m:oMathPara xmlns:m="http://schemas.openxmlformats.org/officeDocument/2006/math">
                     <m:oMathParaPr>
@@ -35161,7 +35170,7 @@
             </p:txBody>
           </p:sp>
         </mc:Choice>
-        <mc:Fallback>
+        <mc:Fallback xmlns="">
           <p:sp>
             <p:nvSpPr>
               <p:cNvPr id="105" name="CaixaDeTexto 104">
@@ -35286,6 +35295,3046 @@
     <p:extLst>
       <p:ext uri="{BB962C8B-B14F-4D97-AF65-F5344CB8AC3E}">
         <p14:creationId xmlns:p14="http://schemas.microsoft.com/office/powerpoint/2010/main" val="2101553972"/>
+      </p:ext>
+    </p:extLst>
+  </p:cSld>
+  <p:clrMapOvr>
+    <a:masterClrMapping/>
+  </p:clrMapOvr>
+</p:sld>
+</file>
+
+<file path=ppt/slides/slide21.xml><?xml version="1.0" encoding="utf-8"?>
+<p:sld xmlns:a="http://schemas.openxmlformats.org/drawingml/2006/main" xmlns:r="http://schemas.openxmlformats.org/officeDocument/2006/relationships" xmlns:p="http://schemas.openxmlformats.org/presentationml/2006/main">
+  <p:cSld>
+    <p:spTree>
+      <p:nvGrpSpPr>
+        <p:cNvPr id="1" name=""/>
+        <p:cNvGrpSpPr/>
+        <p:nvPr/>
+      </p:nvGrpSpPr>
+      <p:grpSpPr>
+        <a:xfrm>
+          <a:off x="0" y="0"/>
+          <a:ext cx="0" cy="0"/>
+          <a:chOff x="0" y="0"/>
+          <a:chExt cx="0" cy="0"/>
+        </a:xfrm>
+      </p:grpSpPr>
+      <p:sp>
+        <p:nvSpPr>
+          <p:cNvPr id="4" name="Retângulo 3">
+            <a:extLst>
+              <a:ext uri="{FF2B5EF4-FFF2-40B4-BE49-F238E27FC236}">
+                <a16:creationId xmlns:a16="http://schemas.microsoft.com/office/drawing/2014/main" id="{EB57A4AB-18B5-1CFF-E33C-52B42E9B11B1}"/>
+              </a:ext>
+            </a:extLst>
+          </p:cNvPr>
+          <p:cNvSpPr/>
+          <p:nvPr/>
+        </p:nvSpPr>
+        <p:spPr>
+          <a:xfrm>
+            <a:off x="3726293" y="2725431"/>
+            <a:ext cx="874644" cy="842839"/>
+          </a:xfrm>
+          <a:prstGeom prst="rect">
+            <a:avLst/>
+          </a:prstGeom>
+          <a:solidFill>
+            <a:schemeClr val="accent1">
+              <a:lumMod val="20000"/>
+              <a:lumOff val="80000"/>
+            </a:schemeClr>
+          </a:solidFill>
+        </p:spPr>
+        <p:style>
+          <a:lnRef idx="2">
+            <a:schemeClr val="accent1">
+              <a:shade val="15000"/>
+            </a:schemeClr>
+          </a:lnRef>
+          <a:fillRef idx="1">
+            <a:schemeClr val="accent1"/>
+          </a:fillRef>
+          <a:effectRef idx="0">
+            <a:schemeClr val="accent1"/>
+          </a:effectRef>
+          <a:fontRef idx="minor">
+            <a:schemeClr val="lt1"/>
+          </a:fontRef>
+        </p:style>
+        <p:txBody>
+          <a:bodyPr rtlCol="0" anchor="ctr"/>
+          <a:lstStyle/>
+          <a:p>
+            <a:pPr algn="ctr"/>
+            <a:r>
+              <a:rPr lang="pt-BR" sz="1400" b="1" i="1">
+                <a:solidFill>
+                  <a:schemeClr val="tx1"/>
+                </a:solidFill>
+              </a:rPr>
+              <a:t>Weak</a:t>
+            </a:r>
+          </a:p>
+          <a:p>
+            <a:pPr algn="ctr"/>
+            <a:r>
+              <a:rPr lang="pt-BR" sz="1400" b="1" i="1">
+                <a:solidFill>
+                  <a:schemeClr val="tx1"/>
+                </a:solidFill>
+              </a:rPr>
+              <a:t>Learner</a:t>
+            </a:r>
+            <a:br>
+              <a:rPr lang="pt-BR" sz="1400" b="1" i="1">
+                <a:solidFill>
+                  <a:schemeClr val="tx1"/>
+                </a:solidFill>
+              </a:rPr>
+            </a:br>
+            <a:r>
+              <a:rPr lang="pt-BR" sz="1400" b="1" i="1">
+                <a:solidFill>
+                  <a:schemeClr val="tx1"/>
+                </a:solidFill>
+              </a:rPr>
+              <a:t>1</a:t>
+            </a:r>
+          </a:p>
+        </p:txBody>
+      </p:sp>
+      <p:sp>
+        <p:nvSpPr>
+          <p:cNvPr id="5" name="Retângulo 4">
+            <a:extLst>
+              <a:ext uri="{FF2B5EF4-FFF2-40B4-BE49-F238E27FC236}">
+                <a16:creationId xmlns:a16="http://schemas.microsoft.com/office/drawing/2014/main" id="{D02E2478-DA03-5C4C-EA22-1EEE73A2510D}"/>
+              </a:ext>
+            </a:extLst>
+          </p:cNvPr>
+          <p:cNvSpPr/>
+          <p:nvPr/>
+        </p:nvSpPr>
+        <p:spPr>
+          <a:xfrm>
+            <a:off x="3726293" y="3914967"/>
+            <a:ext cx="874644" cy="842839"/>
+          </a:xfrm>
+          <a:prstGeom prst="rect">
+            <a:avLst/>
+          </a:prstGeom>
+          <a:solidFill>
+            <a:schemeClr val="accent1">
+              <a:lumMod val="20000"/>
+              <a:lumOff val="80000"/>
+            </a:schemeClr>
+          </a:solidFill>
+        </p:spPr>
+        <p:style>
+          <a:lnRef idx="2">
+            <a:schemeClr val="accent1">
+              <a:shade val="15000"/>
+            </a:schemeClr>
+          </a:lnRef>
+          <a:fillRef idx="1">
+            <a:schemeClr val="accent1"/>
+          </a:fillRef>
+          <a:effectRef idx="0">
+            <a:schemeClr val="accent1"/>
+          </a:effectRef>
+          <a:fontRef idx="minor">
+            <a:schemeClr val="lt1"/>
+          </a:fontRef>
+        </p:style>
+        <p:txBody>
+          <a:bodyPr rtlCol="0" anchor="ctr"/>
+          <a:lstStyle/>
+          <a:p>
+            <a:pPr algn="ctr"/>
+            <a:r>
+              <a:rPr lang="pt-BR" sz="1400" b="1" i="1">
+                <a:solidFill>
+                  <a:schemeClr val="tx1"/>
+                </a:solidFill>
+              </a:rPr>
+              <a:t>Weak</a:t>
+            </a:r>
+          </a:p>
+          <a:p>
+            <a:pPr algn="ctr"/>
+            <a:r>
+              <a:rPr lang="pt-BR" sz="1400" b="1" i="1">
+                <a:solidFill>
+                  <a:schemeClr val="tx1"/>
+                </a:solidFill>
+              </a:rPr>
+              <a:t>Learner</a:t>
+            </a:r>
+            <a:br>
+              <a:rPr lang="pt-BR" sz="1400" b="1" i="1">
+                <a:solidFill>
+                  <a:schemeClr val="tx1"/>
+                </a:solidFill>
+              </a:rPr>
+            </a:br>
+            <a:r>
+              <a:rPr lang="pt-BR" sz="1400" b="1" i="1">
+                <a:solidFill>
+                  <a:schemeClr val="tx1"/>
+                </a:solidFill>
+              </a:rPr>
+              <a:t>2</a:t>
+            </a:r>
+          </a:p>
+        </p:txBody>
+      </p:sp>
+      <p:sp>
+        <p:nvSpPr>
+          <p:cNvPr id="6" name="Retângulo 5">
+            <a:extLst>
+              <a:ext uri="{FF2B5EF4-FFF2-40B4-BE49-F238E27FC236}">
+                <a16:creationId xmlns:a16="http://schemas.microsoft.com/office/drawing/2014/main" id="{50DF744D-0987-E3D6-285E-1755D96A9121}"/>
+              </a:ext>
+            </a:extLst>
+          </p:cNvPr>
+          <p:cNvSpPr/>
+          <p:nvPr/>
+        </p:nvSpPr>
+        <p:spPr>
+          <a:xfrm>
+            <a:off x="3726293" y="5104503"/>
+            <a:ext cx="874644" cy="842839"/>
+          </a:xfrm>
+          <a:prstGeom prst="rect">
+            <a:avLst/>
+          </a:prstGeom>
+          <a:solidFill>
+            <a:schemeClr val="accent1">
+              <a:lumMod val="20000"/>
+              <a:lumOff val="80000"/>
+            </a:schemeClr>
+          </a:solidFill>
+        </p:spPr>
+        <p:style>
+          <a:lnRef idx="2">
+            <a:schemeClr val="accent1">
+              <a:shade val="15000"/>
+            </a:schemeClr>
+          </a:lnRef>
+          <a:fillRef idx="1">
+            <a:schemeClr val="accent1"/>
+          </a:fillRef>
+          <a:effectRef idx="0">
+            <a:schemeClr val="accent1"/>
+          </a:effectRef>
+          <a:fontRef idx="minor">
+            <a:schemeClr val="lt1"/>
+          </a:fontRef>
+        </p:style>
+        <p:txBody>
+          <a:bodyPr rtlCol="0" anchor="ctr"/>
+          <a:lstStyle/>
+          <a:p>
+            <a:pPr algn="ctr"/>
+            <a:r>
+              <a:rPr lang="pt-BR" sz="1400" b="1" i="1">
+                <a:solidFill>
+                  <a:schemeClr val="tx1"/>
+                </a:solidFill>
+              </a:rPr>
+              <a:t>Weak</a:t>
+            </a:r>
+          </a:p>
+          <a:p>
+            <a:pPr algn="ctr"/>
+            <a:r>
+              <a:rPr lang="pt-BR" sz="1400" b="1" i="1">
+                <a:solidFill>
+                  <a:schemeClr val="tx1"/>
+                </a:solidFill>
+              </a:rPr>
+              <a:t>Learner</a:t>
+            </a:r>
+            <a:br>
+              <a:rPr lang="pt-BR" sz="1400" b="1" i="1">
+                <a:solidFill>
+                  <a:schemeClr val="tx1"/>
+                </a:solidFill>
+              </a:rPr>
+            </a:br>
+            <a:r>
+              <a:rPr lang="pt-BR" sz="1400" b="1" i="1">
+                <a:solidFill>
+                  <a:schemeClr val="tx1"/>
+                </a:solidFill>
+              </a:rPr>
+              <a:t>3</a:t>
+            </a:r>
+          </a:p>
+        </p:txBody>
+      </p:sp>
+      <p:grpSp>
+        <p:nvGrpSpPr>
+          <p:cNvPr id="3" name="Agrupar 2">
+            <a:extLst>
+              <a:ext uri="{FF2B5EF4-FFF2-40B4-BE49-F238E27FC236}">
+                <a16:creationId xmlns:a16="http://schemas.microsoft.com/office/drawing/2014/main" id="{591CD4F4-F6D7-915C-7F24-389752685A25}"/>
+              </a:ext>
+            </a:extLst>
+          </p:cNvPr>
+          <p:cNvGrpSpPr/>
+          <p:nvPr/>
+        </p:nvGrpSpPr>
+        <p:grpSpPr>
+          <a:xfrm>
+            <a:off x="1822387" y="4054306"/>
+            <a:ext cx="734047" cy="584478"/>
+            <a:chOff x="1304739" y="3364244"/>
+            <a:chExt cx="734047" cy="584478"/>
+          </a:xfrm>
+        </p:grpSpPr>
+        <mc:AlternateContent xmlns:mc="http://schemas.openxmlformats.org/markup-compatibility/2006">
+          <mc:Choice xmlns:a14="http://schemas.microsoft.com/office/drawing/2010/main" Requires="a14">
+            <p:sp>
+              <p:nvSpPr>
+                <p:cNvPr id="7" name="CaixaDeTexto 6">
+                  <a:extLst>
+                    <a:ext uri="{FF2B5EF4-FFF2-40B4-BE49-F238E27FC236}">
+                      <a16:creationId xmlns:a16="http://schemas.microsoft.com/office/drawing/2014/main" id="{2796FEFC-5C27-5B91-7B54-9D1A8CA8A417}"/>
+                    </a:ext>
+                  </a:extLst>
+                </p:cNvPr>
+                <p:cNvSpPr txBox="1"/>
+                <p:nvPr/>
+              </p:nvSpPr>
+              <p:spPr>
+                <a:xfrm>
+                  <a:off x="1487770" y="3364244"/>
+                  <a:ext cx="367986" cy="369332"/>
+                </a:xfrm>
+                <a:prstGeom prst="rect">
+                  <a:avLst/>
+                </a:prstGeom>
+                <a:noFill/>
+              </p:spPr>
+              <p:txBody>
+                <a:bodyPr wrap="none" rtlCol="0">
+                  <a:spAutoFit/>
+                </a:bodyPr>
+                <a:lstStyle/>
+                <a:p>
+                  <a:pPr/>
+                  <a14:m>
+                    <m:oMathPara xmlns:m="http://schemas.openxmlformats.org/officeDocument/2006/math">
+                      <m:oMathParaPr>
+                        <m:jc m:val="centerGroup"/>
+                      </m:oMathParaPr>
+                      <m:oMath xmlns:m="http://schemas.openxmlformats.org/officeDocument/2006/math">
+                        <m:r>
+                          <a:rPr lang="pt-BR" b="1" i="1" smtClean="0">
+                            <a:latin typeface="Cambria Math" panose="02040503050406030204" pitchFamily="18" charset="0"/>
+                          </a:rPr>
+                          <m:t>𝒙</m:t>
+                        </m:r>
+                      </m:oMath>
+                    </m:oMathPara>
+                  </a14:m>
+                  <a:endParaRPr lang="pt-BR" b="1"/>
+                </a:p>
+              </p:txBody>
+            </p:sp>
+          </mc:Choice>
+          <mc:Fallback>
+            <p:sp>
+              <p:nvSpPr>
+                <p:cNvPr id="7" name="CaixaDeTexto 6">
+                  <a:extLst>
+                    <a:ext uri="{FF2B5EF4-FFF2-40B4-BE49-F238E27FC236}">
+                      <a16:creationId xmlns:a16="http://schemas.microsoft.com/office/drawing/2014/main" id="{2796FEFC-5C27-5B91-7B54-9D1A8CA8A417}"/>
+                    </a:ext>
+                  </a:extLst>
+                </p:cNvPr>
+                <p:cNvSpPr txBox="1">
+                  <a:spLocks noRot="1" noChangeAspect="1" noMove="1" noResize="1" noEditPoints="1" noAdjustHandles="1" noChangeArrowheads="1" noChangeShapeType="1" noTextEdit="1"/>
+                </p:cNvSpPr>
+                <p:nvPr/>
+              </p:nvSpPr>
+              <p:spPr>
+                <a:xfrm>
+                  <a:off x="1487770" y="3364244"/>
+                  <a:ext cx="367986" cy="369332"/>
+                </a:xfrm>
+                <a:prstGeom prst="rect">
+                  <a:avLst/>
+                </a:prstGeom>
+                <a:blipFill>
+                  <a:blip r:embed="rId2"/>
+                  <a:stretch>
+                    <a:fillRect/>
+                  </a:stretch>
+                </a:blipFill>
+              </p:spPr>
+              <p:txBody>
+                <a:bodyPr/>
+                <a:lstStyle/>
+                <a:p>
+                  <a:r>
+                    <a:rPr lang="pt-BR">
+                      <a:noFill/>
+                    </a:rPr>
+                    <a:t> </a:t>
+                  </a:r>
+                </a:p>
+              </p:txBody>
+            </p:sp>
+          </mc:Fallback>
+        </mc:AlternateContent>
+        <p:sp>
+          <p:nvSpPr>
+            <p:cNvPr id="108" name="CaixaDeTexto 107">
+              <a:extLst>
+                <a:ext uri="{FF2B5EF4-FFF2-40B4-BE49-F238E27FC236}">
+                  <a16:creationId xmlns:a16="http://schemas.microsoft.com/office/drawing/2014/main" id="{9BC28F92-04A3-3AE0-0F51-216ADCA0B4E4}"/>
+                </a:ext>
+              </a:extLst>
+            </p:cNvPr>
+            <p:cNvSpPr txBox="1"/>
+            <p:nvPr/>
+          </p:nvSpPr>
+          <p:spPr>
+            <a:xfrm>
+              <a:off x="1304739" y="3640945"/>
+              <a:ext cx="734047" cy="307777"/>
+            </a:xfrm>
+            <a:prstGeom prst="rect">
+              <a:avLst/>
+            </a:prstGeom>
+            <a:noFill/>
+          </p:spPr>
+          <p:txBody>
+            <a:bodyPr wrap="none" rtlCol="0">
+              <a:spAutoFit/>
+            </a:bodyPr>
+            <a:lstStyle/>
+            <a:p>
+              <a:r>
+                <a:rPr lang="pt-BR" sz="1400" b="1" i="0">
+                  <a:latin typeface="+mj-lt"/>
+                </a:rPr>
+                <a:t>entrada</a:t>
+              </a:r>
+              <a:endParaRPr lang="pt-BR" b="1"/>
+            </a:p>
+          </p:txBody>
+        </p:sp>
+      </p:grpSp>
+      <p:cxnSp>
+        <p:nvCxnSpPr>
+          <p:cNvPr id="9" name="Conector reto 8">
+            <a:extLst>
+              <a:ext uri="{FF2B5EF4-FFF2-40B4-BE49-F238E27FC236}">
+                <a16:creationId xmlns:a16="http://schemas.microsoft.com/office/drawing/2014/main" id="{E9C1B02B-BEEB-33A6-BBBF-3F92B34898A8}"/>
+              </a:ext>
+            </a:extLst>
+          </p:cNvPr>
+          <p:cNvCxnSpPr>
+            <a:cxnSpLocks/>
+          </p:cNvCxnSpPr>
+          <p:nvPr/>
+        </p:nvCxnSpPr>
+        <p:spPr>
+          <a:xfrm>
+            <a:off x="2923512" y="3139230"/>
+            <a:ext cx="0" cy="2407010"/>
+          </a:xfrm>
+          <a:prstGeom prst="line">
+            <a:avLst/>
+          </a:prstGeom>
+          <a:ln w="28575"/>
+        </p:spPr>
+        <p:style>
+          <a:lnRef idx="1">
+            <a:schemeClr val="accent1"/>
+          </a:lnRef>
+          <a:fillRef idx="0">
+            <a:schemeClr val="accent1"/>
+          </a:fillRef>
+          <a:effectRef idx="0">
+            <a:schemeClr val="accent1"/>
+          </a:effectRef>
+          <a:fontRef idx="minor">
+            <a:schemeClr val="tx1"/>
+          </a:fontRef>
+        </p:style>
+      </p:cxnSp>
+      <p:cxnSp>
+        <p:nvCxnSpPr>
+          <p:cNvPr id="11" name="Conector de Seta Reta 10">
+            <a:extLst>
+              <a:ext uri="{FF2B5EF4-FFF2-40B4-BE49-F238E27FC236}">
+                <a16:creationId xmlns:a16="http://schemas.microsoft.com/office/drawing/2014/main" id="{A0E000B1-7AED-0634-839A-4629E9940CAE}"/>
+              </a:ext>
+            </a:extLst>
+          </p:cNvPr>
+          <p:cNvCxnSpPr>
+            <a:cxnSpLocks/>
+            <a:endCxn id="4" idx="1"/>
+          </p:cNvCxnSpPr>
+          <p:nvPr/>
+        </p:nvCxnSpPr>
+        <p:spPr>
+          <a:xfrm>
+            <a:off x="2910177" y="3146850"/>
+            <a:ext cx="816116" cy="1"/>
+          </a:xfrm>
+          <a:prstGeom prst="straightConnector1">
+            <a:avLst/>
+          </a:prstGeom>
+          <a:ln w="28575">
+            <a:tailEnd type="triangle"/>
+          </a:ln>
+        </p:spPr>
+        <p:style>
+          <a:lnRef idx="1">
+            <a:schemeClr val="accent1"/>
+          </a:lnRef>
+          <a:fillRef idx="0">
+            <a:schemeClr val="accent1"/>
+          </a:fillRef>
+          <a:effectRef idx="0">
+            <a:schemeClr val="accent1"/>
+          </a:effectRef>
+          <a:fontRef idx="minor">
+            <a:schemeClr val="tx1"/>
+          </a:fontRef>
+        </p:style>
+      </p:cxnSp>
+      <p:cxnSp>
+        <p:nvCxnSpPr>
+          <p:cNvPr id="15" name="Conector de Seta Reta 14">
+            <a:extLst>
+              <a:ext uri="{FF2B5EF4-FFF2-40B4-BE49-F238E27FC236}">
+                <a16:creationId xmlns:a16="http://schemas.microsoft.com/office/drawing/2014/main" id="{F4A1F6A2-27C0-4412-99CE-1C7D213774DA}"/>
+              </a:ext>
+            </a:extLst>
+          </p:cNvPr>
+          <p:cNvCxnSpPr>
+            <a:cxnSpLocks/>
+          </p:cNvCxnSpPr>
+          <p:nvPr/>
+        </p:nvCxnSpPr>
+        <p:spPr>
+          <a:xfrm>
+            <a:off x="2911448" y="4346545"/>
+            <a:ext cx="816116" cy="1"/>
+          </a:xfrm>
+          <a:prstGeom prst="straightConnector1">
+            <a:avLst/>
+          </a:prstGeom>
+          <a:ln w="28575">
+            <a:tailEnd type="triangle"/>
+          </a:ln>
+        </p:spPr>
+        <p:style>
+          <a:lnRef idx="1">
+            <a:schemeClr val="accent1"/>
+          </a:lnRef>
+          <a:fillRef idx="0">
+            <a:schemeClr val="accent1"/>
+          </a:fillRef>
+          <a:effectRef idx="0">
+            <a:schemeClr val="accent1"/>
+          </a:effectRef>
+          <a:fontRef idx="minor">
+            <a:schemeClr val="tx1"/>
+          </a:fontRef>
+        </p:style>
+      </p:cxnSp>
+      <p:cxnSp>
+        <p:nvCxnSpPr>
+          <p:cNvPr id="17" name="Conector de Seta Reta 16">
+            <a:extLst>
+              <a:ext uri="{FF2B5EF4-FFF2-40B4-BE49-F238E27FC236}">
+                <a16:creationId xmlns:a16="http://schemas.microsoft.com/office/drawing/2014/main" id="{643A5E98-65BD-F3CA-833C-DEDF0BAABB36}"/>
+              </a:ext>
+            </a:extLst>
+          </p:cNvPr>
+          <p:cNvCxnSpPr>
+            <a:cxnSpLocks/>
+          </p:cNvCxnSpPr>
+          <p:nvPr/>
+        </p:nvCxnSpPr>
+        <p:spPr>
+          <a:xfrm>
+            <a:off x="2910625" y="5546240"/>
+            <a:ext cx="816116" cy="1"/>
+          </a:xfrm>
+          <a:prstGeom prst="straightConnector1">
+            <a:avLst/>
+          </a:prstGeom>
+          <a:ln w="28575">
+            <a:tailEnd type="triangle"/>
+          </a:ln>
+        </p:spPr>
+        <p:style>
+          <a:lnRef idx="1">
+            <a:schemeClr val="accent1"/>
+          </a:lnRef>
+          <a:fillRef idx="0">
+            <a:schemeClr val="accent1"/>
+          </a:fillRef>
+          <a:effectRef idx="0">
+            <a:schemeClr val="accent1"/>
+          </a:effectRef>
+          <a:fontRef idx="minor">
+            <a:schemeClr val="tx1"/>
+          </a:fontRef>
+        </p:style>
+      </p:cxnSp>
+      <p:cxnSp>
+        <p:nvCxnSpPr>
+          <p:cNvPr id="21" name="Conector reto 20">
+            <a:extLst>
+              <a:ext uri="{FF2B5EF4-FFF2-40B4-BE49-F238E27FC236}">
+                <a16:creationId xmlns:a16="http://schemas.microsoft.com/office/drawing/2014/main" id="{E54D9533-F8A3-3B04-F770-F7B350EC57D0}"/>
+              </a:ext>
+            </a:extLst>
+          </p:cNvPr>
+          <p:cNvCxnSpPr/>
+          <p:nvPr/>
+        </p:nvCxnSpPr>
+        <p:spPr>
+          <a:xfrm>
+            <a:off x="2474976" y="4346546"/>
+            <a:ext cx="460601" cy="0"/>
+          </a:xfrm>
+          <a:prstGeom prst="line">
+            <a:avLst/>
+          </a:prstGeom>
+          <a:ln w="28575"/>
+        </p:spPr>
+        <p:style>
+          <a:lnRef idx="1">
+            <a:schemeClr val="accent1"/>
+          </a:lnRef>
+          <a:fillRef idx="0">
+            <a:schemeClr val="accent1"/>
+          </a:fillRef>
+          <a:effectRef idx="0">
+            <a:schemeClr val="accent1"/>
+          </a:effectRef>
+          <a:fontRef idx="minor">
+            <a:schemeClr val="tx1"/>
+          </a:fontRef>
+        </p:style>
+      </p:cxnSp>
+      <mc:AlternateContent xmlns:mc="http://schemas.openxmlformats.org/markup-compatibility/2006">
+        <mc:Choice xmlns:a14="http://schemas.microsoft.com/office/drawing/2010/main" Requires="a14">
+          <p:sp>
+            <p:nvSpPr>
+              <p:cNvPr id="24" name="Elipse 23">
+                <a:extLst>
+                  <a:ext uri="{FF2B5EF4-FFF2-40B4-BE49-F238E27FC236}">
+                    <a16:creationId xmlns:a16="http://schemas.microsoft.com/office/drawing/2014/main" id="{9E513172-05BB-28F4-F8FE-4A92F48D6109}"/>
+                  </a:ext>
+                </a:extLst>
+              </p:cNvPr>
+              <p:cNvSpPr/>
+              <p:nvPr/>
+            </p:nvSpPr>
+            <p:spPr>
+              <a:xfrm>
+                <a:off x="6466399" y="4148675"/>
+                <a:ext cx="360000" cy="360000"/>
+              </a:xfrm>
+              <a:prstGeom prst="ellipse">
+                <a:avLst/>
+              </a:prstGeom>
+              <a:solidFill>
+                <a:schemeClr val="bg1"/>
+              </a:solidFill>
+            </p:spPr>
+            <p:style>
+              <a:lnRef idx="2">
+                <a:schemeClr val="accent1">
+                  <a:shade val="15000"/>
+                </a:schemeClr>
+              </a:lnRef>
+              <a:fillRef idx="1">
+                <a:schemeClr val="accent1"/>
+              </a:fillRef>
+              <a:effectRef idx="0">
+                <a:schemeClr val="accent1"/>
+              </a:effectRef>
+              <a:fontRef idx="minor">
+                <a:schemeClr val="lt1"/>
+              </a:fontRef>
+            </p:style>
+            <p:txBody>
+              <a:bodyPr rtlCol="0" anchor="ctr"/>
+              <a:lstStyle/>
+              <a:p>
+                <a:pPr algn="ctr"/>
+                <a14:m>
+                  <m:oMathPara xmlns:m="http://schemas.openxmlformats.org/officeDocument/2006/math">
+                    <m:oMathParaPr>
+                      <m:jc m:val="centerGroup"/>
+                    </m:oMathParaPr>
+                    <m:oMath xmlns:m="http://schemas.openxmlformats.org/officeDocument/2006/math">
+                      <m:r>
+                        <a:rPr lang="pt-BR" b="0" i="0" smtClean="0">
+                          <a:solidFill>
+                            <a:schemeClr val="tx1"/>
+                          </a:solidFill>
+                          <a:latin typeface="Cambria Math" panose="02040503050406030204" pitchFamily="18" charset="0"/>
+                        </a:rPr>
+                        <m:t> </m:t>
+                      </m:r>
+                      <m:r>
+                        <m:rPr>
+                          <m:sty m:val="p"/>
+                        </m:rPr>
+                        <a:rPr lang="pt-BR" b="0" i="0" smtClean="0">
+                          <a:solidFill>
+                            <a:schemeClr val="tx1"/>
+                          </a:solidFill>
+                          <a:latin typeface="Cambria Math" panose="02040503050406030204" pitchFamily="18" charset="0"/>
+                        </a:rPr>
+                        <m:t>Σ</m:t>
+                      </m:r>
+                    </m:oMath>
+                  </m:oMathPara>
+                </a14:m>
+                <a:endParaRPr lang="pt-BR">
+                  <a:solidFill>
+                    <a:schemeClr val="tx1"/>
+                  </a:solidFill>
+                </a:endParaRPr>
+              </a:p>
+            </p:txBody>
+          </p:sp>
+        </mc:Choice>
+        <mc:Fallback>
+          <p:sp>
+            <p:nvSpPr>
+              <p:cNvPr id="24" name="Elipse 23">
+                <a:extLst>
+                  <a:ext uri="{FF2B5EF4-FFF2-40B4-BE49-F238E27FC236}">
+                    <a16:creationId xmlns:a16="http://schemas.microsoft.com/office/drawing/2014/main" id="{9E513172-05BB-28F4-F8FE-4A92F48D6109}"/>
+                  </a:ext>
+                </a:extLst>
+              </p:cNvPr>
+              <p:cNvSpPr>
+                <a:spLocks noRot="1" noChangeAspect="1" noMove="1" noResize="1" noEditPoints="1" noAdjustHandles="1" noChangeArrowheads="1" noChangeShapeType="1" noTextEdit="1"/>
+              </p:cNvSpPr>
+              <p:nvPr/>
+            </p:nvSpPr>
+            <p:spPr>
+              <a:xfrm>
+                <a:off x="6466399" y="4148675"/>
+                <a:ext cx="360000" cy="360000"/>
+              </a:xfrm>
+              <a:prstGeom prst="ellipse">
+                <a:avLst/>
+              </a:prstGeom>
+              <a:blipFill>
+                <a:blip r:embed="rId3"/>
+                <a:stretch>
+                  <a:fillRect/>
+                </a:stretch>
+              </a:blipFill>
+            </p:spPr>
+            <p:txBody>
+              <a:bodyPr/>
+              <a:lstStyle/>
+              <a:p>
+                <a:r>
+                  <a:rPr lang="pt-BR">
+                    <a:noFill/>
+                  </a:rPr>
+                  <a:t> </a:t>
+                </a:r>
+              </a:p>
+            </p:txBody>
+          </p:sp>
+        </mc:Fallback>
+      </mc:AlternateContent>
+      <p:cxnSp>
+        <p:nvCxnSpPr>
+          <p:cNvPr id="25" name="Conector de Seta Reta 24">
+            <a:extLst>
+              <a:ext uri="{FF2B5EF4-FFF2-40B4-BE49-F238E27FC236}">
+                <a16:creationId xmlns:a16="http://schemas.microsoft.com/office/drawing/2014/main" id="{83FDA3A7-C2E2-12D8-733F-64A766CE38AC}"/>
+              </a:ext>
+            </a:extLst>
+          </p:cNvPr>
+          <p:cNvCxnSpPr>
+            <a:cxnSpLocks/>
+            <a:stCxn id="24" idx="6"/>
+          </p:cNvCxnSpPr>
+          <p:nvPr/>
+        </p:nvCxnSpPr>
+        <p:spPr>
+          <a:xfrm>
+            <a:off x="6826399" y="4328675"/>
+            <a:ext cx="538460" cy="0"/>
+          </a:xfrm>
+          <a:prstGeom prst="straightConnector1">
+            <a:avLst/>
+          </a:prstGeom>
+          <a:ln w="28575">
+            <a:solidFill>
+              <a:schemeClr val="accent1"/>
+            </a:solidFill>
+            <a:tailEnd type="triangle"/>
+          </a:ln>
+        </p:spPr>
+        <p:style>
+          <a:lnRef idx="1">
+            <a:schemeClr val="accent1"/>
+          </a:lnRef>
+          <a:fillRef idx="0">
+            <a:schemeClr val="accent1"/>
+          </a:fillRef>
+          <a:effectRef idx="0">
+            <a:schemeClr val="accent1"/>
+          </a:effectRef>
+          <a:fontRef idx="minor">
+            <a:schemeClr val="tx1"/>
+          </a:fontRef>
+        </p:style>
+      </p:cxnSp>
+      <p:grpSp>
+        <p:nvGrpSpPr>
+          <p:cNvPr id="31" name="Agrupar 30">
+            <a:extLst>
+              <a:ext uri="{FF2B5EF4-FFF2-40B4-BE49-F238E27FC236}">
+                <a16:creationId xmlns:a16="http://schemas.microsoft.com/office/drawing/2014/main" id="{48718BD3-A272-8667-CC0D-9D9F55BA7DAF}"/>
+              </a:ext>
+            </a:extLst>
+          </p:cNvPr>
+          <p:cNvGrpSpPr/>
+          <p:nvPr/>
+        </p:nvGrpSpPr>
+        <p:grpSpPr>
+          <a:xfrm>
+            <a:off x="7276425" y="4037602"/>
+            <a:ext cx="653128" cy="582146"/>
+            <a:chOff x="7037992" y="4070859"/>
+            <a:chExt cx="653128" cy="582146"/>
+          </a:xfrm>
+        </p:grpSpPr>
+        <mc:AlternateContent xmlns:mc="http://schemas.openxmlformats.org/markup-compatibility/2006">
+          <mc:Choice xmlns:a14="http://schemas.microsoft.com/office/drawing/2010/main" Requires="a14">
+            <p:sp>
+              <p:nvSpPr>
+                <p:cNvPr id="26" name="CaixaDeTexto 25">
+                  <a:extLst>
+                    <a:ext uri="{FF2B5EF4-FFF2-40B4-BE49-F238E27FC236}">
+                      <a16:creationId xmlns:a16="http://schemas.microsoft.com/office/drawing/2014/main" id="{20C48161-0E3C-5FD2-C7B3-455EF4B76161}"/>
+                    </a:ext>
+                  </a:extLst>
+                </p:cNvPr>
+                <p:cNvSpPr txBox="1"/>
+                <p:nvPr/>
+              </p:nvSpPr>
+              <p:spPr>
+                <a:xfrm>
+                  <a:off x="7037992" y="4070859"/>
+                  <a:ext cx="653128" cy="338554"/>
+                </a:xfrm>
+                <a:prstGeom prst="rect">
+                  <a:avLst/>
+                </a:prstGeom>
+                <a:noFill/>
+              </p:spPr>
+              <p:txBody>
+                <a:bodyPr wrap="none" rtlCol="0">
+                  <a:spAutoFit/>
+                </a:bodyPr>
+                <a:lstStyle/>
+                <a:p>
+                  <a:pPr/>
+                  <a14:m>
+                    <m:oMathPara xmlns:m="http://schemas.openxmlformats.org/officeDocument/2006/math">
+                      <m:oMathParaPr>
+                        <m:jc m:val="centerGroup"/>
+                      </m:oMathParaPr>
+                      <m:oMath xmlns:m="http://schemas.openxmlformats.org/officeDocument/2006/math">
+                        <m:r>
+                          <a:rPr lang="pt-BR" sz="1600" b="0" i="1" smtClean="0">
+                            <a:latin typeface="Cambria Math" panose="02040503050406030204" pitchFamily="18" charset="0"/>
+                          </a:rPr>
+                          <m:t>𝐹</m:t>
+                        </m:r>
+                        <m:d>
+                          <m:dPr>
+                            <m:ctrlPr>
+                              <a:rPr lang="pt-BR" sz="1600" b="0" i="1" smtClean="0">
+                                <a:latin typeface="Cambria Math" panose="02040503050406030204" pitchFamily="18" charset="0"/>
+                              </a:rPr>
+                            </m:ctrlPr>
+                          </m:dPr>
+                          <m:e>
+                            <m:r>
+                              <a:rPr lang="pt-BR" sz="1600" b="1" i="1" smtClean="0">
+                                <a:latin typeface="Cambria Math" panose="02040503050406030204" pitchFamily="18" charset="0"/>
+                              </a:rPr>
+                              <m:t>𝒙</m:t>
+                            </m:r>
+                          </m:e>
+                        </m:d>
+                      </m:oMath>
+                    </m:oMathPara>
+                  </a14:m>
+                  <a:endParaRPr lang="pt-BR" sz="1600"/>
+                </a:p>
+              </p:txBody>
+            </p:sp>
+          </mc:Choice>
+          <mc:Fallback>
+            <p:sp>
+              <p:nvSpPr>
+                <p:cNvPr id="26" name="CaixaDeTexto 25">
+                  <a:extLst>
+                    <a:ext uri="{FF2B5EF4-FFF2-40B4-BE49-F238E27FC236}">
+                      <a16:creationId xmlns:a16="http://schemas.microsoft.com/office/drawing/2014/main" id="{20C48161-0E3C-5FD2-C7B3-455EF4B76161}"/>
+                    </a:ext>
+                  </a:extLst>
+                </p:cNvPr>
+                <p:cNvSpPr txBox="1">
+                  <a:spLocks noRot="1" noChangeAspect="1" noMove="1" noResize="1" noEditPoints="1" noAdjustHandles="1" noChangeArrowheads="1" noChangeShapeType="1" noTextEdit="1"/>
+                </p:cNvSpPr>
+                <p:nvPr/>
+              </p:nvSpPr>
+              <p:spPr>
+                <a:xfrm>
+                  <a:off x="7037992" y="4070859"/>
+                  <a:ext cx="653128" cy="338554"/>
+                </a:xfrm>
+                <a:prstGeom prst="rect">
+                  <a:avLst/>
+                </a:prstGeom>
+                <a:blipFill>
+                  <a:blip r:embed="rId4"/>
+                  <a:stretch>
+                    <a:fillRect/>
+                  </a:stretch>
+                </a:blipFill>
+              </p:spPr>
+              <p:txBody>
+                <a:bodyPr/>
+                <a:lstStyle/>
+                <a:p>
+                  <a:r>
+                    <a:rPr lang="pt-BR">
+                      <a:noFill/>
+                    </a:rPr>
+                    <a:t> </a:t>
+                  </a:r>
+                </a:p>
+              </p:txBody>
+            </p:sp>
+          </mc:Fallback>
+        </mc:AlternateContent>
+        <p:sp>
+          <p:nvSpPr>
+            <p:cNvPr id="28" name="CaixaDeTexto 27">
+              <a:extLst>
+                <a:ext uri="{FF2B5EF4-FFF2-40B4-BE49-F238E27FC236}">
+                  <a16:creationId xmlns:a16="http://schemas.microsoft.com/office/drawing/2014/main" id="{6E94C3C9-690E-C68E-076D-27C723E19982}"/>
+                </a:ext>
+              </a:extLst>
+            </p:cNvPr>
+            <p:cNvSpPr txBox="1"/>
+            <p:nvPr/>
+          </p:nvSpPr>
+          <p:spPr>
+            <a:xfrm>
+              <a:off x="7059888" y="4345228"/>
+              <a:ext cx="550151" cy="307777"/>
+            </a:xfrm>
+            <a:prstGeom prst="rect">
+              <a:avLst/>
+            </a:prstGeom>
+            <a:noFill/>
+          </p:spPr>
+          <p:txBody>
+            <a:bodyPr wrap="none" rtlCol="0">
+              <a:spAutoFit/>
+            </a:bodyPr>
+            <a:lstStyle/>
+            <a:p>
+              <a:r>
+                <a:rPr lang="pt-BR" sz="1400" b="1" i="0">
+                  <a:latin typeface="+mj-lt"/>
+                </a:rPr>
+                <a:t>saída</a:t>
+              </a:r>
+              <a:endParaRPr lang="pt-BR" b="1"/>
+            </a:p>
+          </p:txBody>
+        </p:sp>
+      </p:grpSp>
+      <p:cxnSp>
+        <p:nvCxnSpPr>
+          <p:cNvPr id="29" name="Conector de Seta Reta 28">
+            <a:extLst>
+              <a:ext uri="{FF2B5EF4-FFF2-40B4-BE49-F238E27FC236}">
+                <a16:creationId xmlns:a16="http://schemas.microsoft.com/office/drawing/2014/main" id="{855F23A6-DE22-EBE5-5312-AD2C585B50C8}"/>
+              </a:ext>
+            </a:extLst>
+          </p:cNvPr>
+          <p:cNvCxnSpPr>
+            <a:cxnSpLocks/>
+            <a:stCxn id="5" idx="3"/>
+            <a:endCxn id="24" idx="2"/>
+          </p:cNvCxnSpPr>
+          <p:nvPr/>
+        </p:nvCxnSpPr>
+        <p:spPr>
+          <a:xfrm flipV="1">
+            <a:off x="4600937" y="4328675"/>
+            <a:ext cx="1865462" cy="7712"/>
+          </a:xfrm>
+          <a:prstGeom prst="straightConnector1">
+            <a:avLst/>
+          </a:prstGeom>
+          <a:ln w="28575">
+            <a:solidFill>
+              <a:schemeClr val="accent1"/>
+            </a:solidFill>
+            <a:tailEnd type="triangle"/>
+          </a:ln>
+        </p:spPr>
+        <p:style>
+          <a:lnRef idx="1">
+            <a:schemeClr val="accent1"/>
+          </a:lnRef>
+          <a:fillRef idx="0">
+            <a:schemeClr val="accent1"/>
+          </a:fillRef>
+          <a:effectRef idx="0">
+            <a:schemeClr val="accent1"/>
+          </a:effectRef>
+          <a:fontRef idx="minor">
+            <a:schemeClr val="tx1"/>
+          </a:fontRef>
+        </p:style>
+      </p:cxnSp>
+      <p:grpSp>
+        <p:nvGrpSpPr>
+          <p:cNvPr id="106" name="Agrupar 105">
+            <a:extLst>
+              <a:ext uri="{FF2B5EF4-FFF2-40B4-BE49-F238E27FC236}">
+                <a16:creationId xmlns:a16="http://schemas.microsoft.com/office/drawing/2014/main" id="{BB29815E-1A6B-456A-FA5F-3649A9F5D331}"/>
+              </a:ext>
+            </a:extLst>
+          </p:cNvPr>
+          <p:cNvGrpSpPr/>
+          <p:nvPr/>
+        </p:nvGrpSpPr>
+        <p:grpSpPr>
+          <a:xfrm>
+            <a:off x="5249224" y="4114530"/>
+            <a:ext cx="441726" cy="383985"/>
+            <a:chOff x="7780594" y="2484556"/>
+            <a:chExt cx="441726" cy="383985"/>
+          </a:xfrm>
+        </p:grpSpPr>
+        <p:sp>
+          <p:nvSpPr>
+            <p:cNvPr id="74" name="Triângulo isósceles 73">
+              <a:extLst>
+                <a:ext uri="{FF2B5EF4-FFF2-40B4-BE49-F238E27FC236}">
+                  <a16:creationId xmlns:a16="http://schemas.microsoft.com/office/drawing/2014/main" id="{8789981B-4901-74F8-2B88-B1A8BCCF0FD4}"/>
+                </a:ext>
+              </a:extLst>
+            </p:cNvPr>
+            <p:cNvSpPr/>
+            <p:nvPr/>
+          </p:nvSpPr>
+          <p:spPr>
+            <a:xfrm rot="5400000">
+              <a:off x="7879183" y="2525404"/>
+              <a:ext cx="340360" cy="345914"/>
+            </a:xfrm>
+            <a:prstGeom prst="triangle">
+              <a:avLst/>
+            </a:prstGeom>
+            <a:solidFill>
+              <a:schemeClr val="bg1"/>
+            </a:solidFill>
+            <a:ln>
+              <a:solidFill>
+                <a:schemeClr val="tx1"/>
+              </a:solidFill>
+            </a:ln>
+          </p:spPr>
+          <p:style>
+            <a:lnRef idx="2">
+              <a:schemeClr val="accent1">
+                <a:shade val="15000"/>
+              </a:schemeClr>
+            </a:lnRef>
+            <a:fillRef idx="1">
+              <a:schemeClr val="accent1"/>
+            </a:fillRef>
+            <a:effectRef idx="0">
+              <a:schemeClr val="accent1"/>
+            </a:effectRef>
+            <a:fontRef idx="minor">
+              <a:schemeClr val="lt1"/>
+            </a:fontRef>
+          </p:style>
+          <p:txBody>
+            <a:bodyPr rtlCol="0" anchor="ctr"/>
+            <a:lstStyle/>
+            <a:p>
+              <a:pPr algn="ctr"/>
+              <a:endParaRPr lang="pt-BR"/>
+            </a:p>
+          </p:txBody>
+        </p:sp>
+        <mc:AlternateContent xmlns:mc="http://schemas.openxmlformats.org/markup-compatibility/2006">
+          <mc:Choice xmlns:a14="http://schemas.microsoft.com/office/drawing/2010/main" Requires="a14">
+            <p:sp>
+              <p:nvSpPr>
+                <p:cNvPr id="77" name="CaixaDeTexto 76">
+                  <a:extLst>
+                    <a:ext uri="{FF2B5EF4-FFF2-40B4-BE49-F238E27FC236}">
+                      <a16:creationId xmlns:a16="http://schemas.microsoft.com/office/drawing/2014/main" id="{0309FE81-BB02-8B78-9C0D-15BF28AF0CA8}"/>
+                    </a:ext>
+                  </a:extLst>
+                </p:cNvPr>
+                <p:cNvSpPr txBox="1"/>
+                <p:nvPr/>
+              </p:nvSpPr>
+              <p:spPr>
+                <a:xfrm>
+                  <a:off x="7780594" y="2484556"/>
+                  <a:ext cx="440056" cy="338554"/>
+                </a:xfrm>
+                <a:prstGeom prst="rect">
+                  <a:avLst/>
+                </a:prstGeom>
+                <a:noFill/>
+              </p:spPr>
+              <p:txBody>
+                <a:bodyPr wrap="none" rtlCol="0">
+                  <a:spAutoFit/>
+                </a:bodyPr>
+                <a:lstStyle/>
+                <a:p>
+                  <a:pPr/>
+                  <a14:m>
+                    <m:oMathPara xmlns:m="http://schemas.openxmlformats.org/officeDocument/2006/math">
+                      <m:oMathParaPr>
+                        <m:jc m:val="centerGroup"/>
+                      </m:oMathParaPr>
+                      <m:oMath xmlns:m="http://schemas.openxmlformats.org/officeDocument/2006/math">
+                        <m:sSub>
+                          <m:sSubPr>
+                            <m:ctrlPr>
+                              <a:rPr lang="pt-BR" sz="1600" b="0" i="1" smtClean="0">
+                                <a:latin typeface="Cambria Math" panose="02040503050406030204" pitchFamily="18" charset="0"/>
+                              </a:rPr>
+                            </m:ctrlPr>
+                          </m:sSubPr>
+                          <m:e>
+                            <m:r>
+                              <a:rPr lang="pt-BR" sz="1600" b="0" i="1" smtClean="0">
+                                <a:latin typeface="Cambria Math" panose="02040503050406030204" pitchFamily="18" charset="0"/>
+                              </a:rPr>
+                              <m:t>𝑎</m:t>
+                            </m:r>
+                          </m:e>
+                          <m:sub>
+                            <m:r>
+                              <a:rPr lang="pt-BR" sz="1600" b="0" i="1" smtClean="0">
+                                <a:latin typeface="Cambria Math" panose="02040503050406030204" pitchFamily="18" charset="0"/>
+                              </a:rPr>
+                              <m:t>2</m:t>
+                            </m:r>
+                          </m:sub>
+                        </m:sSub>
+                      </m:oMath>
+                    </m:oMathPara>
+                  </a14:m>
+                  <a:endParaRPr lang="pt-BR" sz="1600"/>
+                </a:p>
+              </p:txBody>
+            </p:sp>
+          </mc:Choice>
+          <mc:Fallback>
+            <p:sp>
+              <p:nvSpPr>
+                <p:cNvPr id="77" name="CaixaDeTexto 76">
+                  <a:extLst>
+                    <a:ext uri="{FF2B5EF4-FFF2-40B4-BE49-F238E27FC236}">
+                      <a16:creationId xmlns:a16="http://schemas.microsoft.com/office/drawing/2014/main" id="{0309FE81-BB02-8B78-9C0D-15BF28AF0CA8}"/>
+                    </a:ext>
+                  </a:extLst>
+                </p:cNvPr>
+                <p:cNvSpPr txBox="1">
+                  <a:spLocks noRot="1" noChangeAspect="1" noMove="1" noResize="1" noEditPoints="1" noAdjustHandles="1" noChangeArrowheads="1" noChangeShapeType="1" noTextEdit="1"/>
+                </p:cNvSpPr>
+                <p:nvPr/>
+              </p:nvSpPr>
+              <p:spPr>
+                <a:xfrm>
+                  <a:off x="7780594" y="2484556"/>
+                  <a:ext cx="440056" cy="338554"/>
+                </a:xfrm>
+                <a:prstGeom prst="rect">
+                  <a:avLst/>
+                </a:prstGeom>
+                <a:blipFill>
+                  <a:blip r:embed="rId5"/>
+                  <a:stretch>
+                    <a:fillRect/>
+                  </a:stretch>
+                </a:blipFill>
+              </p:spPr>
+              <p:txBody>
+                <a:bodyPr/>
+                <a:lstStyle/>
+                <a:p>
+                  <a:r>
+                    <a:rPr lang="pt-BR">
+                      <a:noFill/>
+                    </a:rPr>
+                    <a:t> </a:t>
+                  </a:r>
+                </a:p>
+              </p:txBody>
+            </p:sp>
+          </mc:Fallback>
+        </mc:AlternateContent>
+      </p:grpSp>
+      <p:cxnSp>
+        <p:nvCxnSpPr>
+          <p:cNvPr id="39" name="Conector de Seta Reta 38">
+            <a:extLst>
+              <a:ext uri="{FF2B5EF4-FFF2-40B4-BE49-F238E27FC236}">
+                <a16:creationId xmlns:a16="http://schemas.microsoft.com/office/drawing/2014/main" id="{939AED64-3A20-C89A-23E2-919EC710B63D}"/>
+              </a:ext>
+            </a:extLst>
+          </p:cNvPr>
+          <p:cNvCxnSpPr>
+            <a:cxnSpLocks/>
+            <a:endCxn id="24" idx="4"/>
+          </p:cNvCxnSpPr>
+          <p:nvPr/>
+        </p:nvCxnSpPr>
+        <p:spPr>
+          <a:xfrm flipV="1">
+            <a:off x="6646399" y="4508675"/>
+            <a:ext cx="0" cy="1017247"/>
+          </a:xfrm>
+          <a:prstGeom prst="straightConnector1">
+            <a:avLst/>
+          </a:prstGeom>
+          <a:ln w="28575">
+            <a:solidFill>
+              <a:schemeClr val="accent1"/>
+            </a:solidFill>
+            <a:tailEnd type="triangle"/>
+          </a:ln>
+        </p:spPr>
+        <p:style>
+          <a:lnRef idx="1">
+            <a:schemeClr val="accent1"/>
+          </a:lnRef>
+          <a:fillRef idx="0">
+            <a:schemeClr val="accent1"/>
+          </a:fillRef>
+          <a:effectRef idx="0">
+            <a:schemeClr val="accent1"/>
+          </a:effectRef>
+          <a:fontRef idx="minor">
+            <a:schemeClr val="tx1"/>
+          </a:fontRef>
+        </p:style>
+      </p:cxnSp>
+      <p:cxnSp>
+        <p:nvCxnSpPr>
+          <p:cNvPr id="43" name="Conector de Seta Reta 42">
+            <a:extLst>
+              <a:ext uri="{FF2B5EF4-FFF2-40B4-BE49-F238E27FC236}">
+                <a16:creationId xmlns:a16="http://schemas.microsoft.com/office/drawing/2014/main" id="{4882BD9E-2146-9764-4785-C1381A8CE605}"/>
+              </a:ext>
+            </a:extLst>
+          </p:cNvPr>
+          <p:cNvCxnSpPr>
+            <a:cxnSpLocks/>
+            <a:endCxn id="24" idx="0"/>
+          </p:cNvCxnSpPr>
+          <p:nvPr/>
+        </p:nvCxnSpPr>
+        <p:spPr>
+          <a:xfrm>
+            <a:off x="6646399" y="3139230"/>
+            <a:ext cx="0" cy="1009445"/>
+          </a:xfrm>
+          <a:prstGeom prst="straightConnector1">
+            <a:avLst/>
+          </a:prstGeom>
+          <a:ln w="28575">
+            <a:solidFill>
+              <a:schemeClr val="accent1"/>
+            </a:solidFill>
+            <a:tailEnd type="triangle"/>
+          </a:ln>
+        </p:spPr>
+        <p:style>
+          <a:lnRef idx="1">
+            <a:schemeClr val="accent1"/>
+          </a:lnRef>
+          <a:fillRef idx="0">
+            <a:schemeClr val="accent1"/>
+          </a:fillRef>
+          <a:effectRef idx="0">
+            <a:schemeClr val="accent1"/>
+          </a:effectRef>
+          <a:fontRef idx="minor">
+            <a:schemeClr val="tx1"/>
+          </a:fontRef>
+        </p:style>
+      </p:cxnSp>
+      <p:cxnSp>
+        <p:nvCxnSpPr>
+          <p:cNvPr id="48" name="Conector reto 47">
+            <a:extLst>
+              <a:ext uri="{FF2B5EF4-FFF2-40B4-BE49-F238E27FC236}">
+                <a16:creationId xmlns:a16="http://schemas.microsoft.com/office/drawing/2014/main" id="{EDE0D07D-5BA8-01B7-6FB7-45FFAF202C88}"/>
+              </a:ext>
+            </a:extLst>
+          </p:cNvPr>
+          <p:cNvCxnSpPr>
+            <a:cxnSpLocks/>
+            <a:stCxn id="4" idx="3"/>
+          </p:cNvCxnSpPr>
+          <p:nvPr/>
+        </p:nvCxnSpPr>
+        <p:spPr>
+          <a:xfrm>
+            <a:off x="4600937" y="3146851"/>
+            <a:ext cx="2057156" cy="0"/>
+          </a:xfrm>
+          <a:prstGeom prst="line">
+            <a:avLst/>
+          </a:prstGeom>
+          <a:ln w="28575"/>
+        </p:spPr>
+        <p:style>
+          <a:lnRef idx="1">
+            <a:schemeClr val="accent1"/>
+          </a:lnRef>
+          <a:fillRef idx="0">
+            <a:schemeClr val="accent1"/>
+          </a:fillRef>
+          <a:effectRef idx="0">
+            <a:schemeClr val="accent1"/>
+          </a:effectRef>
+          <a:fontRef idx="minor">
+            <a:schemeClr val="tx1"/>
+          </a:fontRef>
+        </p:style>
+      </p:cxnSp>
+      <p:cxnSp>
+        <p:nvCxnSpPr>
+          <p:cNvPr id="54" name="Conector reto 53">
+            <a:extLst>
+              <a:ext uri="{FF2B5EF4-FFF2-40B4-BE49-F238E27FC236}">
+                <a16:creationId xmlns:a16="http://schemas.microsoft.com/office/drawing/2014/main" id="{818E58E1-BE92-56D8-76AF-1FA6F90F1BBE}"/>
+              </a:ext>
+            </a:extLst>
+          </p:cNvPr>
+          <p:cNvCxnSpPr>
+            <a:cxnSpLocks/>
+            <a:stCxn id="6" idx="3"/>
+          </p:cNvCxnSpPr>
+          <p:nvPr/>
+        </p:nvCxnSpPr>
+        <p:spPr>
+          <a:xfrm flipV="1">
+            <a:off x="4600937" y="5525922"/>
+            <a:ext cx="2057156" cy="1"/>
+          </a:xfrm>
+          <a:prstGeom prst="line">
+            <a:avLst/>
+          </a:prstGeom>
+          <a:ln w="28575"/>
+        </p:spPr>
+        <p:style>
+          <a:lnRef idx="1">
+            <a:schemeClr val="accent1"/>
+          </a:lnRef>
+          <a:fillRef idx="0">
+            <a:schemeClr val="accent1"/>
+          </a:fillRef>
+          <a:effectRef idx="0">
+            <a:schemeClr val="accent1"/>
+          </a:effectRef>
+          <a:fontRef idx="minor">
+            <a:schemeClr val="tx1"/>
+          </a:fontRef>
+        </p:style>
+      </p:cxnSp>
+      <p:grpSp>
+        <p:nvGrpSpPr>
+          <p:cNvPr id="61" name="Agrupar 60">
+            <a:extLst>
+              <a:ext uri="{FF2B5EF4-FFF2-40B4-BE49-F238E27FC236}">
+                <a16:creationId xmlns:a16="http://schemas.microsoft.com/office/drawing/2014/main" id="{E32E8429-4041-A3BF-6E18-59FE7C3F1764}"/>
+              </a:ext>
+            </a:extLst>
+          </p:cNvPr>
+          <p:cNvGrpSpPr/>
+          <p:nvPr/>
+        </p:nvGrpSpPr>
+        <p:grpSpPr>
+          <a:xfrm>
+            <a:off x="5249224" y="5306513"/>
+            <a:ext cx="441726" cy="389065"/>
+            <a:chOff x="7780594" y="2479476"/>
+            <a:chExt cx="441726" cy="389065"/>
+          </a:xfrm>
+        </p:grpSpPr>
+        <p:sp>
+          <p:nvSpPr>
+            <p:cNvPr id="62" name="Triângulo isósceles 61">
+              <a:extLst>
+                <a:ext uri="{FF2B5EF4-FFF2-40B4-BE49-F238E27FC236}">
+                  <a16:creationId xmlns:a16="http://schemas.microsoft.com/office/drawing/2014/main" id="{429E48B9-72EC-F288-396A-8E1FAEC18CC1}"/>
+                </a:ext>
+              </a:extLst>
+            </p:cNvPr>
+            <p:cNvSpPr/>
+            <p:nvPr/>
+          </p:nvSpPr>
+          <p:spPr>
+            <a:xfrm rot="5400000">
+              <a:off x="7879183" y="2525404"/>
+              <a:ext cx="340360" cy="345914"/>
+            </a:xfrm>
+            <a:prstGeom prst="triangle">
+              <a:avLst/>
+            </a:prstGeom>
+            <a:solidFill>
+              <a:schemeClr val="bg1"/>
+            </a:solidFill>
+            <a:ln>
+              <a:solidFill>
+                <a:schemeClr val="tx1"/>
+              </a:solidFill>
+            </a:ln>
+          </p:spPr>
+          <p:style>
+            <a:lnRef idx="2">
+              <a:schemeClr val="accent1">
+                <a:shade val="15000"/>
+              </a:schemeClr>
+            </a:lnRef>
+            <a:fillRef idx="1">
+              <a:schemeClr val="accent1"/>
+            </a:fillRef>
+            <a:effectRef idx="0">
+              <a:schemeClr val="accent1"/>
+            </a:effectRef>
+            <a:fontRef idx="minor">
+              <a:schemeClr val="lt1"/>
+            </a:fontRef>
+          </p:style>
+          <p:txBody>
+            <a:bodyPr rtlCol="0" anchor="ctr"/>
+            <a:lstStyle/>
+            <a:p>
+              <a:pPr algn="ctr"/>
+              <a:endParaRPr lang="pt-BR"/>
+            </a:p>
+          </p:txBody>
+        </p:sp>
+        <mc:AlternateContent xmlns:mc="http://schemas.openxmlformats.org/markup-compatibility/2006">
+          <mc:Choice xmlns:a14="http://schemas.microsoft.com/office/drawing/2010/main" Requires="a14">
+            <p:sp>
+              <p:nvSpPr>
+                <p:cNvPr id="63" name="CaixaDeTexto 62">
+                  <a:extLst>
+                    <a:ext uri="{FF2B5EF4-FFF2-40B4-BE49-F238E27FC236}">
+                      <a16:creationId xmlns:a16="http://schemas.microsoft.com/office/drawing/2014/main" id="{A776F7FB-972F-5DB4-3563-917FD111E58D}"/>
+                    </a:ext>
+                  </a:extLst>
+                </p:cNvPr>
+                <p:cNvSpPr txBox="1"/>
+                <p:nvPr/>
+              </p:nvSpPr>
+              <p:spPr>
+                <a:xfrm>
+                  <a:off x="7780594" y="2479476"/>
+                  <a:ext cx="440056" cy="338554"/>
+                </a:xfrm>
+                <a:prstGeom prst="rect">
+                  <a:avLst/>
+                </a:prstGeom>
+                <a:noFill/>
+              </p:spPr>
+              <p:txBody>
+                <a:bodyPr wrap="none" rtlCol="0">
+                  <a:spAutoFit/>
+                </a:bodyPr>
+                <a:lstStyle/>
+                <a:p>
+                  <a:pPr/>
+                  <a14:m>
+                    <m:oMathPara xmlns:m="http://schemas.openxmlformats.org/officeDocument/2006/math">
+                      <m:oMathParaPr>
+                        <m:jc m:val="centerGroup"/>
+                      </m:oMathParaPr>
+                      <m:oMath xmlns:m="http://schemas.openxmlformats.org/officeDocument/2006/math">
+                        <m:sSub>
+                          <m:sSubPr>
+                            <m:ctrlPr>
+                              <a:rPr lang="pt-BR" sz="1600" b="0" i="1" smtClean="0">
+                                <a:latin typeface="Cambria Math" panose="02040503050406030204" pitchFamily="18" charset="0"/>
+                              </a:rPr>
+                            </m:ctrlPr>
+                          </m:sSubPr>
+                          <m:e>
+                            <m:r>
+                              <a:rPr lang="pt-BR" sz="1600" b="0" i="1" smtClean="0">
+                                <a:latin typeface="Cambria Math" panose="02040503050406030204" pitchFamily="18" charset="0"/>
+                              </a:rPr>
+                              <m:t>𝑎</m:t>
+                            </m:r>
+                          </m:e>
+                          <m:sub>
+                            <m:r>
+                              <a:rPr lang="pt-BR" sz="1600" b="0" i="1" smtClean="0">
+                                <a:latin typeface="Cambria Math" panose="02040503050406030204" pitchFamily="18" charset="0"/>
+                              </a:rPr>
+                              <m:t>3</m:t>
+                            </m:r>
+                          </m:sub>
+                        </m:sSub>
+                      </m:oMath>
+                    </m:oMathPara>
+                  </a14:m>
+                  <a:endParaRPr lang="pt-BR" sz="1600"/>
+                </a:p>
+              </p:txBody>
+            </p:sp>
+          </mc:Choice>
+          <mc:Fallback>
+            <p:sp>
+              <p:nvSpPr>
+                <p:cNvPr id="63" name="CaixaDeTexto 62">
+                  <a:extLst>
+                    <a:ext uri="{FF2B5EF4-FFF2-40B4-BE49-F238E27FC236}">
+                      <a16:creationId xmlns:a16="http://schemas.microsoft.com/office/drawing/2014/main" id="{A776F7FB-972F-5DB4-3563-917FD111E58D}"/>
+                    </a:ext>
+                  </a:extLst>
+                </p:cNvPr>
+                <p:cNvSpPr txBox="1">
+                  <a:spLocks noRot="1" noChangeAspect="1" noMove="1" noResize="1" noEditPoints="1" noAdjustHandles="1" noChangeArrowheads="1" noChangeShapeType="1" noTextEdit="1"/>
+                </p:cNvSpPr>
+                <p:nvPr/>
+              </p:nvSpPr>
+              <p:spPr>
+                <a:xfrm>
+                  <a:off x="7780594" y="2479476"/>
+                  <a:ext cx="440056" cy="338554"/>
+                </a:xfrm>
+                <a:prstGeom prst="rect">
+                  <a:avLst/>
+                </a:prstGeom>
+                <a:blipFill>
+                  <a:blip r:embed="rId6"/>
+                  <a:stretch>
+                    <a:fillRect/>
+                  </a:stretch>
+                </a:blipFill>
+              </p:spPr>
+              <p:txBody>
+                <a:bodyPr/>
+                <a:lstStyle/>
+                <a:p>
+                  <a:r>
+                    <a:rPr lang="pt-BR">
+                      <a:noFill/>
+                    </a:rPr>
+                    <a:t> </a:t>
+                  </a:r>
+                </a:p>
+              </p:txBody>
+            </p:sp>
+          </mc:Fallback>
+        </mc:AlternateContent>
+      </p:grpSp>
+      <p:grpSp>
+        <p:nvGrpSpPr>
+          <p:cNvPr id="64" name="Agrupar 63">
+            <a:extLst>
+              <a:ext uri="{FF2B5EF4-FFF2-40B4-BE49-F238E27FC236}">
+                <a16:creationId xmlns:a16="http://schemas.microsoft.com/office/drawing/2014/main" id="{1218F104-BA88-8876-DE12-652B0A9C60AB}"/>
+              </a:ext>
+            </a:extLst>
+          </p:cNvPr>
+          <p:cNvGrpSpPr/>
+          <p:nvPr/>
+        </p:nvGrpSpPr>
+        <p:grpSpPr>
+          <a:xfrm>
+            <a:off x="5254146" y="2924995"/>
+            <a:ext cx="441726" cy="389065"/>
+            <a:chOff x="7780594" y="2479476"/>
+            <a:chExt cx="441726" cy="389065"/>
+          </a:xfrm>
+        </p:grpSpPr>
+        <p:sp>
+          <p:nvSpPr>
+            <p:cNvPr id="65" name="Triângulo isósceles 64">
+              <a:extLst>
+                <a:ext uri="{FF2B5EF4-FFF2-40B4-BE49-F238E27FC236}">
+                  <a16:creationId xmlns:a16="http://schemas.microsoft.com/office/drawing/2014/main" id="{A883A88D-257F-40E9-B8C7-A7647354B5B7}"/>
+                </a:ext>
+              </a:extLst>
+            </p:cNvPr>
+            <p:cNvSpPr/>
+            <p:nvPr/>
+          </p:nvSpPr>
+          <p:spPr>
+            <a:xfrm rot="5400000">
+              <a:off x="7879183" y="2525404"/>
+              <a:ext cx="340360" cy="345914"/>
+            </a:xfrm>
+            <a:prstGeom prst="triangle">
+              <a:avLst/>
+            </a:prstGeom>
+            <a:solidFill>
+              <a:schemeClr val="bg1"/>
+            </a:solidFill>
+            <a:ln>
+              <a:solidFill>
+                <a:schemeClr val="tx1"/>
+              </a:solidFill>
+            </a:ln>
+          </p:spPr>
+          <p:style>
+            <a:lnRef idx="2">
+              <a:schemeClr val="accent1">
+                <a:shade val="15000"/>
+              </a:schemeClr>
+            </a:lnRef>
+            <a:fillRef idx="1">
+              <a:schemeClr val="accent1"/>
+            </a:fillRef>
+            <a:effectRef idx="0">
+              <a:schemeClr val="accent1"/>
+            </a:effectRef>
+            <a:fontRef idx="minor">
+              <a:schemeClr val="lt1"/>
+            </a:fontRef>
+          </p:style>
+          <p:txBody>
+            <a:bodyPr rtlCol="0" anchor="ctr"/>
+            <a:lstStyle/>
+            <a:p>
+              <a:pPr algn="ctr"/>
+              <a:endParaRPr lang="pt-BR"/>
+            </a:p>
+          </p:txBody>
+        </p:sp>
+        <mc:AlternateContent xmlns:mc="http://schemas.openxmlformats.org/markup-compatibility/2006">
+          <mc:Choice xmlns:a14="http://schemas.microsoft.com/office/drawing/2010/main" Requires="a14">
+            <p:sp>
+              <p:nvSpPr>
+                <p:cNvPr id="66" name="CaixaDeTexto 65">
+                  <a:extLst>
+                    <a:ext uri="{FF2B5EF4-FFF2-40B4-BE49-F238E27FC236}">
+                      <a16:creationId xmlns:a16="http://schemas.microsoft.com/office/drawing/2014/main" id="{8599B6CB-5BF8-F104-FAC5-3BB7E7B3B0A9}"/>
+                    </a:ext>
+                  </a:extLst>
+                </p:cNvPr>
+                <p:cNvSpPr txBox="1"/>
+                <p:nvPr/>
+              </p:nvSpPr>
+              <p:spPr>
+                <a:xfrm>
+                  <a:off x="7780594" y="2479476"/>
+                  <a:ext cx="435311" cy="338554"/>
+                </a:xfrm>
+                <a:prstGeom prst="rect">
+                  <a:avLst/>
+                </a:prstGeom>
+                <a:noFill/>
+              </p:spPr>
+              <p:txBody>
+                <a:bodyPr wrap="none" rtlCol="0">
+                  <a:spAutoFit/>
+                </a:bodyPr>
+                <a:lstStyle/>
+                <a:p>
+                  <a:pPr/>
+                  <a14:m>
+                    <m:oMathPara xmlns:m="http://schemas.openxmlformats.org/officeDocument/2006/math">
+                      <m:oMathParaPr>
+                        <m:jc m:val="centerGroup"/>
+                      </m:oMathParaPr>
+                      <m:oMath xmlns:m="http://schemas.openxmlformats.org/officeDocument/2006/math">
+                        <m:sSub>
+                          <m:sSubPr>
+                            <m:ctrlPr>
+                              <a:rPr lang="pt-BR" sz="1600" b="0" i="1" smtClean="0">
+                                <a:latin typeface="Cambria Math" panose="02040503050406030204" pitchFamily="18" charset="0"/>
+                              </a:rPr>
+                            </m:ctrlPr>
+                          </m:sSubPr>
+                          <m:e>
+                            <m:r>
+                              <a:rPr lang="pt-BR" sz="1600" b="0" i="1" smtClean="0">
+                                <a:latin typeface="Cambria Math" panose="02040503050406030204" pitchFamily="18" charset="0"/>
+                              </a:rPr>
+                              <m:t>𝑎</m:t>
+                            </m:r>
+                          </m:e>
+                          <m:sub>
+                            <m:r>
+                              <a:rPr lang="pt-BR" sz="1600" b="0" i="1" smtClean="0">
+                                <a:latin typeface="Cambria Math" panose="02040503050406030204" pitchFamily="18" charset="0"/>
+                              </a:rPr>
+                              <m:t>1</m:t>
+                            </m:r>
+                          </m:sub>
+                        </m:sSub>
+                      </m:oMath>
+                    </m:oMathPara>
+                  </a14:m>
+                  <a:endParaRPr lang="pt-BR" sz="1600"/>
+                </a:p>
+              </p:txBody>
+            </p:sp>
+          </mc:Choice>
+          <mc:Fallback>
+            <p:sp>
+              <p:nvSpPr>
+                <p:cNvPr id="66" name="CaixaDeTexto 65">
+                  <a:extLst>
+                    <a:ext uri="{FF2B5EF4-FFF2-40B4-BE49-F238E27FC236}">
+                      <a16:creationId xmlns:a16="http://schemas.microsoft.com/office/drawing/2014/main" id="{8599B6CB-5BF8-F104-FAC5-3BB7E7B3B0A9}"/>
+                    </a:ext>
+                  </a:extLst>
+                </p:cNvPr>
+                <p:cNvSpPr txBox="1">
+                  <a:spLocks noRot="1" noChangeAspect="1" noMove="1" noResize="1" noEditPoints="1" noAdjustHandles="1" noChangeArrowheads="1" noChangeShapeType="1" noTextEdit="1"/>
+                </p:cNvSpPr>
+                <p:nvPr/>
+              </p:nvSpPr>
+              <p:spPr>
+                <a:xfrm>
+                  <a:off x="7780594" y="2479476"/>
+                  <a:ext cx="435311" cy="338554"/>
+                </a:xfrm>
+                <a:prstGeom prst="rect">
+                  <a:avLst/>
+                </a:prstGeom>
+                <a:blipFill>
+                  <a:blip r:embed="rId7"/>
+                  <a:stretch>
+                    <a:fillRect/>
+                  </a:stretch>
+                </a:blipFill>
+              </p:spPr>
+              <p:txBody>
+                <a:bodyPr/>
+                <a:lstStyle/>
+                <a:p>
+                  <a:r>
+                    <a:rPr lang="pt-BR">
+                      <a:noFill/>
+                    </a:rPr>
+                    <a:t> </a:t>
+                  </a:r>
+                </a:p>
+              </p:txBody>
+            </p:sp>
+          </mc:Fallback>
+        </mc:AlternateContent>
+      </p:grpSp>
+      <mc:AlternateContent xmlns:mc="http://schemas.openxmlformats.org/markup-compatibility/2006">
+        <mc:Choice xmlns:a14="http://schemas.microsoft.com/office/drawing/2010/main" Requires="a14">
+          <p:sp>
+            <p:nvSpPr>
+              <p:cNvPr id="67" name="CaixaDeTexto 66">
+                <a:extLst>
+                  <a:ext uri="{FF2B5EF4-FFF2-40B4-BE49-F238E27FC236}">
+                    <a16:creationId xmlns:a16="http://schemas.microsoft.com/office/drawing/2014/main" id="{09F3BDBE-F230-36F6-803F-A688803A1FE5}"/>
+                  </a:ext>
+                </a:extLst>
+              </p:cNvPr>
+              <p:cNvSpPr txBox="1"/>
+              <p:nvPr/>
+            </p:nvSpPr>
+            <p:spPr>
+              <a:xfrm>
+                <a:off x="4581261" y="2832239"/>
+                <a:ext cx="784061" cy="261610"/>
+              </a:xfrm>
+              <a:prstGeom prst="rect">
+                <a:avLst/>
+              </a:prstGeom>
+              <a:noFill/>
+            </p:spPr>
+            <p:txBody>
+              <a:bodyPr wrap="none" rtlCol="0">
+                <a:spAutoFit/>
+              </a:bodyPr>
+              <a:lstStyle/>
+              <a:p>
+                <a:pPr/>
+                <a14:m>
+                  <m:oMathPara xmlns:m="http://schemas.openxmlformats.org/officeDocument/2006/math">
+                    <m:oMathParaPr>
+                      <m:jc m:val="centerGroup"/>
+                    </m:oMathParaPr>
+                    <m:oMath xmlns:m="http://schemas.openxmlformats.org/officeDocument/2006/math">
+                      <m:sSub>
+                        <m:sSubPr>
+                          <m:ctrlPr>
+                            <a:rPr lang="pt-BR" sz="1100" b="0" i="1" smtClean="0">
+                              <a:solidFill>
+                                <a:schemeClr val="tx1"/>
+                              </a:solidFill>
+                              <a:latin typeface="Cambria Math" panose="02040503050406030204" pitchFamily="18" charset="0"/>
+                            </a:rPr>
+                          </m:ctrlPr>
+                        </m:sSubPr>
+                        <m:e>
+                          <m:r>
+                            <a:rPr lang="pt-BR" sz="1100" b="0" i="1" smtClean="0">
+                              <a:solidFill>
+                                <a:schemeClr val="tx1"/>
+                              </a:solidFill>
+                              <a:latin typeface="Cambria Math" panose="02040503050406030204" pitchFamily="18" charset="0"/>
+                            </a:rPr>
+                            <m:t>𝜙</m:t>
+                          </m:r>
+                        </m:e>
+                        <m:sub>
+                          <m:r>
+                            <a:rPr lang="pt-BR" sz="1100" b="0" i="1" smtClean="0">
+                              <a:solidFill>
+                                <a:schemeClr val="tx1"/>
+                              </a:solidFill>
+                              <a:latin typeface="Cambria Math" panose="02040503050406030204" pitchFamily="18" charset="0"/>
+                            </a:rPr>
+                            <m:t>1</m:t>
+                          </m:r>
+                        </m:sub>
+                      </m:sSub>
+                      <m:d>
+                        <m:dPr>
+                          <m:ctrlPr>
+                            <a:rPr lang="pt-BR" sz="1100" b="0" i="1" smtClean="0">
+                              <a:solidFill>
+                                <a:schemeClr val="tx1"/>
+                              </a:solidFill>
+                              <a:latin typeface="Cambria Math" panose="02040503050406030204" pitchFamily="18" charset="0"/>
+                            </a:rPr>
+                          </m:ctrlPr>
+                        </m:dPr>
+                        <m:e>
+                          <m:r>
+                            <a:rPr lang="pt-BR" sz="1100" b="1" i="1" smtClean="0">
+                              <a:solidFill>
+                                <a:schemeClr val="tx1"/>
+                              </a:solidFill>
+                              <a:latin typeface="Cambria Math" panose="02040503050406030204" pitchFamily="18" charset="0"/>
+                            </a:rPr>
+                            <m:t>𝒙</m:t>
+                          </m:r>
+                          <m:r>
+                            <a:rPr lang="pt-BR" sz="1100" b="0" i="1" smtClean="0">
+                              <a:solidFill>
+                                <a:schemeClr val="tx1"/>
+                              </a:solidFill>
+                              <a:latin typeface="Cambria Math" panose="02040503050406030204" pitchFamily="18" charset="0"/>
+                            </a:rPr>
+                            <m:t>;</m:t>
+                          </m:r>
+                          <m:sSub>
+                            <m:sSubPr>
+                              <m:ctrlPr>
+                                <a:rPr lang="pt-BR" sz="1100" b="0" i="1" smtClean="0">
+                                  <a:solidFill>
+                                    <a:schemeClr val="tx1"/>
+                                  </a:solidFill>
+                                  <a:latin typeface="Cambria Math" panose="02040503050406030204" pitchFamily="18" charset="0"/>
+                                </a:rPr>
+                              </m:ctrlPr>
+                            </m:sSubPr>
+                            <m:e>
+                              <m:r>
+                                <a:rPr lang="pt-BR" sz="1100" b="1" i="1" smtClean="0">
+                                  <a:solidFill>
+                                    <a:schemeClr val="tx1"/>
+                                  </a:solidFill>
+                                  <a:latin typeface="Cambria Math" panose="02040503050406030204" pitchFamily="18" charset="0"/>
+                                </a:rPr>
+                                <m:t>𝜽</m:t>
+                              </m:r>
+                            </m:e>
+                            <m:sub>
+                              <m:r>
+                                <a:rPr lang="pt-BR" sz="1100" b="0" i="1" smtClean="0">
+                                  <a:solidFill>
+                                    <a:schemeClr val="tx1"/>
+                                  </a:solidFill>
+                                  <a:latin typeface="Cambria Math" panose="02040503050406030204" pitchFamily="18" charset="0"/>
+                                </a:rPr>
+                                <m:t>1</m:t>
+                              </m:r>
+                            </m:sub>
+                          </m:sSub>
+                        </m:e>
+                      </m:d>
+                    </m:oMath>
+                  </m:oMathPara>
+                </a14:m>
+                <a:endParaRPr lang="pt-BR" sz="1100">
+                  <a:solidFill>
+                    <a:schemeClr val="tx1"/>
+                  </a:solidFill>
+                </a:endParaRPr>
+              </a:p>
+            </p:txBody>
+          </p:sp>
+        </mc:Choice>
+        <mc:Fallback>
+          <p:sp>
+            <p:nvSpPr>
+              <p:cNvPr id="67" name="CaixaDeTexto 66">
+                <a:extLst>
+                  <a:ext uri="{FF2B5EF4-FFF2-40B4-BE49-F238E27FC236}">
+                    <a16:creationId xmlns:a16="http://schemas.microsoft.com/office/drawing/2014/main" id="{09F3BDBE-F230-36F6-803F-A688803A1FE5}"/>
+                  </a:ext>
+                </a:extLst>
+              </p:cNvPr>
+              <p:cNvSpPr txBox="1">
+                <a:spLocks noRot="1" noChangeAspect="1" noMove="1" noResize="1" noEditPoints="1" noAdjustHandles="1" noChangeArrowheads="1" noChangeShapeType="1" noTextEdit="1"/>
+              </p:cNvSpPr>
+              <p:nvPr/>
+            </p:nvSpPr>
+            <p:spPr>
+              <a:xfrm>
+                <a:off x="4581261" y="2832239"/>
+                <a:ext cx="784061" cy="261610"/>
+              </a:xfrm>
+              <a:prstGeom prst="rect">
+                <a:avLst/>
+              </a:prstGeom>
+              <a:blipFill>
+                <a:blip r:embed="rId8"/>
+                <a:stretch>
+                  <a:fillRect b="-4651"/>
+                </a:stretch>
+              </a:blipFill>
+            </p:spPr>
+            <p:txBody>
+              <a:bodyPr/>
+              <a:lstStyle/>
+              <a:p>
+                <a:r>
+                  <a:rPr lang="pt-BR">
+                    <a:noFill/>
+                  </a:rPr>
+                  <a:t> </a:t>
+                </a:r>
+              </a:p>
+            </p:txBody>
+          </p:sp>
+        </mc:Fallback>
+      </mc:AlternateContent>
+      <mc:AlternateContent xmlns:mc="http://schemas.openxmlformats.org/markup-compatibility/2006">
+        <mc:Choice xmlns:a14="http://schemas.microsoft.com/office/drawing/2010/main" Requires="a14">
+          <p:sp>
+            <p:nvSpPr>
+              <p:cNvPr id="68" name="CaixaDeTexto 67">
+                <a:extLst>
+                  <a:ext uri="{FF2B5EF4-FFF2-40B4-BE49-F238E27FC236}">
+                    <a16:creationId xmlns:a16="http://schemas.microsoft.com/office/drawing/2014/main" id="{B277B3CC-DD6B-0736-FF0E-DDB6F82F23C3}"/>
+                  </a:ext>
+                </a:extLst>
+              </p:cNvPr>
+              <p:cNvSpPr txBox="1"/>
+              <p:nvPr/>
+            </p:nvSpPr>
+            <p:spPr>
+              <a:xfrm>
+                <a:off x="5598654" y="2829105"/>
+                <a:ext cx="924484" cy="261610"/>
+              </a:xfrm>
+              <a:prstGeom prst="rect">
+                <a:avLst/>
+              </a:prstGeom>
+              <a:noFill/>
+            </p:spPr>
+            <p:txBody>
+              <a:bodyPr wrap="none" rtlCol="0">
+                <a:spAutoFit/>
+              </a:bodyPr>
+              <a:lstStyle/>
+              <a:p>
+                <a:pPr/>
+                <a14:m>
+                  <m:oMathPara xmlns:m="http://schemas.openxmlformats.org/officeDocument/2006/math">
+                    <m:oMathParaPr>
+                      <m:jc m:val="centerGroup"/>
+                    </m:oMathParaPr>
+                    <m:oMath xmlns:m="http://schemas.openxmlformats.org/officeDocument/2006/math">
+                      <m:sSub>
+                        <m:sSubPr>
+                          <m:ctrlPr>
+                            <a:rPr lang="pt-BR" sz="1100" b="0" i="1" smtClean="0">
+                              <a:solidFill>
+                                <a:schemeClr val="tx1"/>
+                              </a:solidFill>
+                              <a:latin typeface="Cambria Math" panose="02040503050406030204" pitchFamily="18" charset="0"/>
+                            </a:rPr>
+                          </m:ctrlPr>
+                        </m:sSubPr>
+                        <m:e>
+                          <m:r>
+                            <a:rPr lang="pt-BR" sz="1100" b="0" i="1" smtClean="0">
+                              <a:solidFill>
+                                <a:schemeClr val="tx1"/>
+                              </a:solidFill>
+                              <a:latin typeface="Cambria Math" panose="02040503050406030204" pitchFamily="18" charset="0"/>
+                            </a:rPr>
+                            <m:t>𝑎</m:t>
+                          </m:r>
+                        </m:e>
+                        <m:sub>
+                          <m:r>
+                            <a:rPr lang="pt-BR" sz="1100" b="0" i="1" smtClean="0">
+                              <a:solidFill>
+                                <a:schemeClr val="tx1"/>
+                              </a:solidFill>
+                              <a:latin typeface="Cambria Math" panose="02040503050406030204" pitchFamily="18" charset="0"/>
+                            </a:rPr>
+                            <m:t>1</m:t>
+                          </m:r>
+                        </m:sub>
+                      </m:sSub>
+                      <m:sSub>
+                        <m:sSubPr>
+                          <m:ctrlPr>
+                            <a:rPr lang="pt-BR" sz="1100" b="0" i="1" smtClean="0">
+                              <a:solidFill>
+                                <a:schemeClr val="tx1"/>
+                              </a:solidFill>
+                              <a:latin typeface="Cambria Math" panose="02040503050406030204" pitchFamily="18" charset="0"/>
+                            </a:rPr>
+                          </m:ctrlPr>
+                        </m:sSubPr>
+                        <m:e>
+                          <m:r>
+                            <a:rPr lang="pt-BR" sz="1100" b="0" i="1" smtClean="0">
+                              <a:solidFill>
+                                <a:schemeClr val="tx1"/>
+                              </a:solidFill>
+                              <a:latin typeface="Cambria Math" panose="02040503050406030204" pitchFamily="18" charset="0"/>
+                            </a:rPr>
+                            <m:t>𝜙</m:t>
+                          </m:r>
+                        </m:e>
+                        <m:sub>
+                          <m:r>
+                            <a:rPr lang="pt-BR" sz="1100" b="0" i="1" smtClean="0">
+                              <a:solidFill>
+                                <a:schemeClr val="tx1"/>
+                              </a:solidFill>
+                              <a:latin typeface="Cambria Math" panose="02040503050406030204" pitchFamily="18" charset="0"/>
+                            </a:rPr>
+                            <m:t>1</m:t>
+                          </m:r>
+                        </m:sub>
+                      </m:sSub>
+                      <m:d>
+                        <m:dPr>
+                          <m:ctrlPr>
+                            <a:rPr lang="pt-BR" sz="1100" b="0" i="1" smtClean="0">
+                              <a:solidFill>
+                                <a:schemeClr val="tx1"/>
+                              </a:solidFill>
+                              <a:latin typeface="Cambria Math" panose="02040503050406030204" pitchFamily="18" charset="0"/>
+                            </a:rPr>
+                          </m:ctrlPr>
+                        </m:dPr>
+                        <m:e>
+                          <m:r>
+                            <a:rPr lang="pt-BR" sz="1100" b="1" i="1" smtClean="0">
+                              <a:solidFill>
+                                <a:schemeClr val="tx1"/>
+                              </a:solidFill>
+                              <a:latin typeface="Cambria Math" panose="02040503050406030204" pitchFamily="18" charset="0"/>
+                            </a:rPr>
+                            <m:t>𝒙</m:t>
+                          </m:r>
+                          <m:r>
+                            <a:rPr lang="pt-BR" sz="1100" b="0" i="1" smtClean="0">
+                              <a:solidFill>
+                                <a:schemeClr val="tx1"/>
+                              </a:solidFill>
+                              <a:latin typeface="Cambria Math" panose="02040503050406030204" pitchFamily="18" charset="0"/>
+                            </a:rPr>
+                            <m:t>;</m:t>
+                          </m:r>
+                          <m:sSub>
+                            <m:sSubPr>
+                              <m:ctrlPr>
+                                <a:rPr lang="pt-BR" sz="1100" b="0" i="1" smtClean="0">
+                                  <a:solidFill>
+                                    <a:schemeClr val="tx1"/>
+                                  </a:solidFill>
+                                  <a:latin typeface="Cambria Math" panose="02040503050406030204" pitchFamily="18" charset="0"/>
+                                </a:rPr>
+                              </m:ctrlPr>
+                            </m:sSubPr>
+                            <m:e>
+                              <m:r>
+                                <a:rPr lang="pt-BR" sz="1100" b="1" i="1" smtClean="0">
+                                  <a:solidFill>
+                                    <a:schemeClr val="tx1"/>
+                                  </a:solidFill>
+                                  <a:latin typeface="Cambria Math" panose="02040503050406030204" pitchFamily="18" charset="0"/>
+                                </a:rPr>
+                                <m:t>𝜽</m:t>
+                              </m:r>
+                            </m:e>
+                            <m:sub>
+                              <m:r>
+                                <a:rPr lang="pt-BR" sz="1100" b="0" i="1" smtClean="0">
+                                  <a:solidFill>
+                                    <a:schemeClr val="tx1"/>
+                                  </a:solidFill>
+                                  <a:latin typeface="Cambria Math" panose="02040503050406030204" pitchFamily="18" charset="0"/>
+                                </a:rPr>
+                                <m:t>1</m:t>
+                              </m:r>
+                            </m:sub>
+                          </m:sSub>
+                        </m:e>
+                      </m:d>
+                    </m:oMath>
+                  </m:oMathPara>
+                </a14:m>
+                <a:endParaRPr lang="pt-BR" sz="1100">
+                  <a:solidFill>
+                    <a:schemeClr val="tx1"/>
+                  </a:solidFill>
+                </a:endParaRPr>
+              </a:p>
+            </p:txBody>
+          </p:sp>
+        </mc:Choice>
+        <mc:Fallback>
+          <p:sp>
+            <p:nvSpPr>
+              <p:cNvPr id="68" name="CaixaDeTexto 67">
+                <a:extLst>
+                  <a:ext uri="{FF2B5EF4-FFF2-40B4-BE49-F238E27FC236}">
+                    <a16:creationId xmlns:a16="http://schemas.microsoft.com/office/drawing/2014/main" id="{B277B3CC-DD6B-0736-FF0E-DDB6F82F23C3}"/>
+                  </a:ext>
+                </a:extLst>
+              </p:cNvPr>
+              <p:cNvSpPr txBox="1">
+                <a:spLocks noRot="1" noChangeAspect="1" noMove="1" noResize="1" noEditPoints="1" noAdjustHandles="1" noChangeArrowheads="1" noChangeShapeType="1" noTextEdit="1"/>
+              </p:cNvSpPr>
+              <p:nvPr/>
+            </p:nvSpPr>
+            <p:spPr>
+              <a:xfrm>
+                <a:off x="5598654" y="2829105"/>
+                <a:ext cx="924484" cy="261610"/>
+              </a:xfrm>
+              <a:prstGeom prst="rect">
+                <a:avLst/>
+              </a:prstGeom>
+              <a:blipFill>
+                <a:blip r:embed="rId9"/>
+                <a:stretch>
+                  <a:fillRect b="-6977"/>
+                </a:stretch>
+              </a:blipFill>
+            </p:spPr>
+            <p:txBody>
+              <a:bodyPr/>
+              <a:lstStyle/>
+              <a:p>
+                <a:r>
+                  <a:rPr lang="pt-BR">
+                    <a:noFill/>
+                  </a:rPr>
+                  <a:t> </a:t>
+                </a:r>
+              </a:p>
+            </p:txBody>
+          </p:sp>
+        </mc:Fallback>
+      </mc:AlternateContent>
+      <mc:AlternateContent xmlns:mc="http://schemas.openxmlformats.org/markup-compatibility/2006">
+        <mc:Choice xmlns:a14="http://schemas.microsoft.com/office/drawing/2010/main" Requires="a14">
+          <p:sp>
+            <p:nvSpPr>
+              <p:cNvPr id="69" name="CaixaDeTexto 68">
+                <a:extLst>
+                  <a:ext uri="{FF2B5EF4-FFF2-40B4-BE49-F238E27FC236}">
+                    <a16:creationId xmlns:a16="http://schemas.microsoft.com/office/drawing/2014/main" id="{0FF614A7-48AC-D568-19C7-429000E9D575}"/>
+                  </a:ext>
+                </a:extLst>
+              </p:cNvPr>
+              <p:cNvSpPr txBox="1"/>
+              <p:nvPr/>
+            </p:nvSpPr>
+            <p:spPr>
+              <a:xfrm>
+                <a:off x="4582417" y="4025978"/>
+                <a:ext cx="790601" cy="261610"/>
+              </a:xfrm>
+              <a:prstGeom prst="rect">
+                <a:avLst/>
+              </a:prstGeom>
+              <a:noFill/>
+            </p:spPr>
+            <p:txBody>
+              <a:bodyPr wrap="none" rtlCol="0">
+                <a:spAutoFit/>
+              </a:bodyPr>
+              <a:lstStyle/>
+              <a:p>
+                <a:pPr/>
+                <a14:m>
+                  <m:oMathPara xmlns:m="http://schemas.openxmlformats.org/officeDocument/2006/math">
+                    <m:oMathParaPr>
+                      <m:jc m:val="centerGroup"/>
+                    </m:oMathParaPr>
+                    <m:oMath xmlns:m="http://schemas.openxmlformats.org/officeDocument/2006/math">
+                      <m:sSub>
+                        <m:sSubPr>
+                          <m:ctrlPr>
+                            <a:rPr lang="pt-BR" sz="1100" b="0" i="1" smtClean="0">
+                              <a:solidFill>
+                                <a:schemeClr val="tx1"/>
+                              </a:solidFill>
+                              <a:latin typeface="Cambria Math" panose="02040503050406030204" pitchFamily="18" charset="0"/>
+                            </a:rPr>
+                          </m:ctrlPr>
+                        </m:sSubPr>
+                        <m:e>
+                          <m:r>
+                            <a:rPr lang="pt-BR" sz="1100" b="0" i="1" smtClean="0">
+                              <a:solidFill>
+                                <a:schemeClr val="tx1"/>
+                              </a:solidFill>
+                              <a:latin typeface="Cambria Math" panose="02040503050406030204" pitchFamily="18" charset="0"/>
+                            </a:rPr>
+                            <m:t>𝜙</m:t>
+                          </m:r>
+                        </m:e>
+                        <m:sub>
+                          <m:r>
+                            <a:rPr lang="pt-BR" sz="1100" b="0" i="1" smtClean="0">
+                              <a:solidFill>
+                                <a:schemeClr val="tx1"/>
+                              </a:solidFill>
+                              <a:latin typeface="Cambria Math" panose="02040503050406030204" pitchFamily="18" charset="0"/>
+                            </a:rPr>
+                            <m:t>2</m:t>
+                          </m:r>
+                        </m:sub>
+                      </m:sSub>
+                      <m:d>
+                        <m:dPr>
+                          <m:ctrlPr>
+                            <a:rPr lang="pt-BR" sz="1100" b="0" i="1" smtClean="0">
+                              <a:solidFill>
+                                <a:schemeClr val="tx1"/>
+                              </a:solidFill>
+                              <a:latin typeface="Cambria Math" panose="02040503050406030204" pitchFamily="18" charset="0"/>
+                            </a:rPr>
+                          </m:ctrlPr>
+                        </m:dPr>
+                        <m:e>
+                          <m:r>
+                            <a:rPr lang="pt-BR" sz="1100" b="1" i="1" smtClean="0">
+                              <a:solidFill>
+                                <a:schemeClr val="tx1"/>
+                              </a:solidFill>
+                              <a:latin typeface="Cambria Math" panose="02040503050406030204" pitchFamily="18" charset="0"/>
+                            </a:rPr>
+                            <m:t>𝒙</m:t>
+                          </m:r>
+                          <m:r>
+                            <a:rPr lang="pt-BR" sz="1100" b="0" i="1" smtClean="0">
+                              <a:solidFill>
+                                <a:schemeClr val="tx1"/>
+                              </a:solidFill>
+                              <a:latin typeface="Cambria Math" panose="02040503050406030204" pitchFamily="18" charset="0"/>
+                            </a:rPr>
+                            <m:t>;</m:t>
+                          </m:r>
+                          <m:sSub>
+                            <m:sSubPr>
+                              <m:ctrlPr>
+                                <a:rPr lang="pt-BR" sz="1100" b="0" i="1" smtClean="0">
+                                  <a:solidFill>
+                                    <a:schemeClr val="tx1"/>
+                                  </a:solidFill>
+                                  <a:latin typeface="Cambria Math" panose="02040503050406030204" pitchFamily="18" charset="0"/>
+                                </a:rPr>
+                              </m:ctrlPr>
+                            </m:sSubPr>
+                            <m:e>
+                              <m:r>
+                                <a:rPr lang="pt-BR" sz="1100" b="1" i="1" smtClean="0">
+                                  <a:solidFill>
+                                    <a:schemeClr val="tx1"/>
+                                  </a:solidFill>
+                                  <a:latin typeface="Cambria Math" panose="02040503050406030204" pitchFamily="18" charset="0"/>
+                                </a:rPr>
+                                <m:t>𝜽</m:t>
+                              </m:r>
+                            </m:e>
+                            <m:sub>
+                              <m:r>
+                                <a:rPr lang="pt-BR" sz="1100" b="0" i="1" smtClean="0">
+                                  <a:solidFill>
+                                    <a:schemeClr val="tx1"/>
+                                  </a:solidFill>
+                                  <a:latin typeface="Cambria Math" panose="02040503050406030204" pitchFamily="18" charset="0"/>
+                                </a:rPr>
+                                <m:t>2</m:t>
+                              </m:r>
+                            </m:sub>
+                          </m:sSub>
+                        </m:e>
+                      </m:d>
+                    </m:oMath>
+                  </m:oMathPara>
+                </a14:m>
+                <a:endParaRPr lang="pt-BR" sz="1100">
+                  <a:solidFill>
+                    <a:schemeClr val="tx1"/>
+                  </a:solidFill>
+                </a:endParaRPr>
+              </a:p>
+            </p:txBody>
+          </p:sp>
+        </mc:Choice>
+        <mc:Fallback>
+          <p:sp>
+            <p:nvSpPr>
+              <p:cNvPr id="69" name="CaixaDeTexto 68">
+                <a:extLst>
+                  <a:ext uri="{FF2B5EF4-FFF2-40B4-BE49-F238E27FC236}">
+                    <a16:creationId xmlns:a16="http://schemas.microsoft.com/office/drawing/2014/main" id="{0FF614A7-48AC-D568-19C7-429000E9D575}"/>
+                  </a:ext>
+                </a:extLst>
+              </p:cNvPr>
+              <p:cNvSpPr txBox="1">
+                <a:spLocks noRot="1" noChangeAspect="1" noMove="1" noResize="1" noEditPoints="1" noAdjustHandles="1" noChangeArrowheads="1" noChangeShapeType="1" noTextEdit="1"/>
+              </p:cNvSpPr>
+              <p:nvPr/>
+            </p:nvSpPr>
+            <p:spPr>
+              <a:xfrm>
+                <a:off x="4582417" y="4025978"/>
+                <a:ext cx="790601" cy="261610"/>
+              </a:xfrm>
+              <a:prstGeom prst="rect">
+                <a:avLst/>
+              </a:prstGeom>
+              <a:blipFill>
+                <a:blip r:embed="rId10"/>
+                <a:stretch>
+                  <a:fillRect b="-6977"/>
+                </a:stretch>
+              </a:blipFill>
+            </p:spPr>
+            <p:txBody>
+              <a:bodyPr/>
+              <a:lstStyle/>
+              <a:p>
+                <a:r>
+                  <a:rPr lang="pt-BR">
+                    <a:noFill/>
+                  </a:rPr>
+                  <a:t> </a:t>
+                </a:r>
+              </a:p>
+            </p:txBody>
+          </p:sp>
+        </mc:Fallback>
+      </mc:AlternateContent>
+      <mc:AlternateContent xmlns:mc="http://schemas.openxmlformats.org/markup-compatibility/2006">
+        <mc:Choice xmlns:a14="http://schemas.microsoft.com/office/drawing/2010/main" Requires="a14">
+          <p:sp>
+            <p:nvSpPr>
+              <p:cNvPr id="70" name="CaixaDeTexto 69">
+                <a:extLst>
+                  <a:ext uri="{FF2B5EF4-FFF2-40B4-BE49-F238E27FC236}">
+                    <a16:creationId xmlns:a16="http://schemas.microsoft.com/office/drawing/2014/main" id="{0087D340-4298-0478-58E9-FEF157864427}"/>
+                  </a:ext>
+                </a:extLst>
+              </p:cNvPr>
+              <p:cNvSpPr txBox="1"/>
+              <p:nvPr/>
+            </p:nvSpPr>
+            <p:spPr>
+              <a:xfrm>
+                <a:off x="5557609" y="4023657"/>
+                <a:ext cx="934294" cy="261610"/>
+              </a:xfrm>
+              <a:prstGeom prst="rect">
+                <a:avLst/>
+              </a:prstGeom>
+              <a:noFill/>
+            </p:spPr>
+            <p:txBody>
+              <a:bodyPr wrap="none" rtlCol="0">
+                <a:spAutoFit/>
+              </a:bodyPr>
+              <a:lstStyle/>
+              <a:p>
+                <a:pPr/>
+                <a14:m>
+                  <m:oMathPara xmlns:m="http://schemas.openxmlformats.org/officeDocument/2006/math">
+                    <m:oMathParaPr>
+                      <m:jc m:val="centerGroup"/>
+                    </m:oMathParaPr>
+                    <m:oMath xmlns:m="http://schemas.openxmlformats.org/officeDocument/2006/math">
+                      <m:sSub>
+                        <m:sSubPr>
+                          <m:ctrlPr>
+                            <a:rPr lang="pt-BR" sz="1100" b="0" i="1" smtClean="0">
+                              <a:solidFill>
+                                <a:schemeClr val="tx1"/>
+                              </a:solidFill>
+                              <a:latin typeface="Cambria Math" panose="02040503050406030204" pitchFamily="18" charset="0"/>
+                            </a:rPr>
+                          </m:ctrlPr>
+                        </m:sSubPr>
+                        <m:e>
+                          <m:r>
+                            <a:rPr lang="pt-BR" sz="1100" b="0" i="1" smtClean="0">
+                              <a:solidFill>
+                                <a:schemeClr val="tx1"/>
+                              </a:solidFill>
+                              <a:latin typeface="Cambria Math" panose="02040503050406030204" pitchFamily="18" charset="0"/>
+                            </a:rPr>
+                            <m:t>𝑎</m:t>
+                          </m:r>
+                        </m:e>
+                        <m:sub>
+                          <m:r>
+                            <a:rPr lang="pt-BR" sz="1100" b="0" i="1" smtClean="0">
+                              <a:solidFill>
+                                <a:schemeClr val="tx1"/>
+                              </a:solidFill>
+                              <a:latin typeface="Cambria Math" panose="02040503050406030204" pitchFamily="18" charset="0"/>
+                            </a:rPr>
+                            <m:t>2</m:t>
+                          </m:r>
+                        </m:sub>
+                      </m:sSub>
+                      <m:sSub>
+                        <m:sSubPr>
+                          <m:ctrlPr>
+                            <a:rPr lang="pt-BR" sz="1100" b="0" i="1" smtClean="0">
+                              <a:solidFill>
+                                <a:schemeClr val="tx1"/>
+                              </a:solidFill>
+                              <a:latin typeface="Cambria Math" panose="02040503050406030204" pitchFamily="18" charset="0"/>
+                            </a:rPr>
+                          </m:ctrlPr>
+                        </m:sSubPr>
+                        <m:e>
+                          <m:r>
+                            <a:rPr lang="pt-BR" sz="1100" b="0" i="1" smtClean="0">
+                              <a:solidFill>
+                                <a:schemeClr val="tx1"/>
+                              </a:solidFill>
+                              <a:latin typeface="Cambria Math" panose="02040503050406030204" pitchFamily="18" charset="0"/>
+                            </a:rPr>
+                            <m:t>𝜙</m:t>
+                          </m:r>
+                        </m:e>
+                        <m:sub>
+                          <m:r>
+                            <a:rPr lang="pt-BR" sz="1100" b="0" i="1" smtClean="0">
+                              <a:solidFill>
+                                <a:schemeClr val="tx1"/>
+                              </a:solidFill>
+                              <a:latin typeface="Cambria Math" panose="02040503050406030204" pitchFamily="18" charset="0"/>
+                            </a:rPr>
+                            <m:t>2</m:t>
+                          </m:r>
+                        </m:sub>
+                      </m:sSub>
+                      <m:d>
+                        <m:dPr>
+                          <m:ctrlPr>
+                            <a:rPr lang="pt-BR" sz="1100" b="0" i="1" smtClean="0">
+                              <a:solidFill>
+                                <a:schemeClr val="tx1"/>
+                              </a:solidFill>
+                              <a:latin typeface="Cambria Math" panose="02040503050406030204" pitchFamily="18" charset="0"/>
+                            </a:rPr>
+                          </m:ctrlPr>
+                        </m:dPr>
+                        <m:e>
+                          <m:r>
+                            <a:rPr lang="pt-BR" sz="1100" b="1" i="1" smtClean="0">
+                              <a:solidFill>
+                                <a:schemeClr val="tx1"/>
+                              </a:solidFill>
+                              <a:latin typeface="Cambria Math" panose="02040503050406030204" pitchFamily="18" charset="0"/>
+                            </a:rPr>
+                            <m:t>𝒙</m:t>
+                          </m:r>
+                          <m:r>
+                            <a:rPr lang="pt-BR" sz="1100" b="0" i="1" smtClean="0">
+                              <a:solidFill>
+                                <a:schemeClr val="tx1"/>
+                              </a:solidFill>
+                              <a:latin typeface="Cambria Math" panose="02040503050406030204" pitchFamily="18" charset="0"/>
+                            </a:rPr>
+                            <m:t>;</m:t>
+                          </m:r>
+                          <m:sSub>
+                            <m:sSubPr>
+                              <m:ctrlPr>
+                                <a:rPr lang="pt-BR" sz="1100" b="0" i="1" smtClean="0">
+                                  <a:solidFill>
+                                    <a:schemeClr val="tx1"/>
+                                  </a:solidFill>
+                                  <a:latin typeface="Cambria Math" panose="02040503050406030204" pitchFamily="18" charset="0"/>
+                                </a:rPr>
+                              </m:ctrlPr>
+                            </m:sSubPr>
+                            <m:e>
+                              <m:r>
+                                <a:rPr lang="pt-BR" sz="1100" b="1" i="1" smtClean="0">
+                                  <a:solidFill>
+                                    <a:schemeClr val="tx1"/>
+                                  </a:solidFill>
+                                  <a:latin typeface="Cambria Math" panose="02040503050406030204" pitchFamily="18" charset="0"/>
+                                </a:rPr>
+                                <m:t>𝜽</m:t>
+                              </m:r>
+                            </m:e>
+                            <m:sub>
+                              <m:r>
+                                <a:rPr lang="pt-BR" sz="1100" b="0" i="1" smtClean="0">
+                                  <a:solidFill>
+                                    <a:schemeClr val="tx1"/>
+                                  </a:solidFill>
+                                  <a:latin typeface="Cambria Math" panose="02040503050406030204" pitchFamily="18" charset="0"/>
+                                </a:rPr>
+                                <m:t>2</m:t>
+                              </m:r>
+                            </m:sub>
+                          </m:sSub>
+                        </m:e>
+                      </m:d>
+                    </m:oMath>
+                  </m:oMathPara>
+                </a14:m>
+                <a:endParaRPr lang="pt-BR" sz="1100">
+                  <a:solidFill>
+                    <a:schemeClr val="tx1"/>
+                  </a:solidFill>
+                </a:endParaRPr>
+              </a:p>
+            </p:txBody>
+          </p:sp>
+        </mc:Choice>
+        <mc:Fallback>
+          <p:sp>
+            <p:nvSpPr>
+              <p:cNvPr id="70" name="CaixaDeTexto 69">
+                <a:extLst>
+                  <a:ext uri="{FF2B5EF4-FFF2-40B4-BE49-F238E27FC236}">
+                    <a16:creationId xmlns:a16="http://schemas.microsoft.com/office/drawing/2014/main" id="{0087D340-4298-0478-58E9-FEF157864427}"/>
+                  </a:ext>
+                </a:extLst>
+              </p:cNvPr>
+              <p:cNvSpPr txBox="1">
+                <a:spLocks noRot="1" noChangeAspect="1" noMove="1" noResize="1" noEditPoints="1" noAdjustHandles="1" noChangeArrowheads="1" noChangeShapeType="1" noTextEdit="1"/>
+              </p:cNvSpPr>
+              <p:nvPr/>
+            </p:nvSpPr>
+            <p:spPr>
+              <a:xfrm>
+                <a:off x="5557609" y="4023657"/>
+                <a:ext cx="934294" cy="261610"/>
+              </a:xfrm>
+              <a:prstGeom prst="rect">
+                <a:avLst/>
+              </a:prstGeom>
+              <a:blipFill>
+                <a:blip r:embed="rId11"/>
+                <a:stretch>
+                  <a:fillRect b="-6977"/>
+                </a:stretch>
+              </a:blipFill>
+            </p:spPr>
+            <p:txBody>
+              <a:bodyPr/>
+              <a:lstStyle/>
+              <a:p>
+                <a:r>
+                  <a:rPr lang="pt-BR">
+                    <a:noFill/>
+                  </a:rPr>
+                  <a:t> </a:t>
+                </a:r>
+              </a:p>
+            </p:txBody>
+          </p:sp>
+        </mc:Fallback>
+      </mc:AlternateContent>
+      <mc:AlternateContent xmlns:mc="http://schemas.openxmlformats.org/markup-compatibility/2006">
+        <mc:Choice xmlns:a14="http://schemas.microsoft.com/office/drawing/2010/main" Requires="a14">
+          <p:sp>
+            <p:nvSpPr>
+              <p:cNvPr id="71" name="CaixaDeTexto 70">
+                <a:extLst>
+                  <a:ext uri="{FF2B5EF4-FFF2-40B4-BE49-F238E27FC236}">
+                    <a16:creationId xmlns:a16="http://schemas.microsoft.com/office/drawing/2014/main" id="{7B7471DA-0B75-726E-77F2-E82AFEA09C69}"/>
+                  </a:ext>
+                </a:extLst>
+              </p:cNvPr>
+              <p:cNvSpPr txBox="1"/>
+              <p:nvPr/>
+            </p:nvSpPr>
+            <p:spPr>
+              <a:xfrm>
+                <a:off x="5614275" y="5248548"/>
+                <a:ext cx="934294" cy="261610"/>
+              </a:xfrm>
+              <a:prstGeom prst="rect">
+                <a:avLst/>
+              </a:prstGeom>
+              <a:noFill/>
+            </p:spPr>
+            <p:txBody>
+              <a:bodyPr wrap="none" rtlCol="0">
+                <a:spAutoFit/>
+              </a:bodyPr>
+              <a:lstStyle/>
+              <a:p>
+                <a:pPr/>
+                <a14:m>
+                  <m:oMathPara xmlns:m="http://schemas.openxmlformats.org/officeDocument/2006/math">
+                    <m:oMathParaPr>
+                      <m:jc m:val="centerGroup"/>
+                    </m:oMathParaPr>
+                    <m:oMath xmlns:m="http://schemas.openxmlformats.org/officeDocument/2006/math">
+                      <m:sSub>
+                        <m:sSubPr>
+                          <m:ctrlPr>
+                            <a:rPr lang="pt-BR" sz="1100" b="0" i="1" smtClean="0">
+                              <a:solidFill>
+                                <a:schemeClr val="tx1"/>
+                              </a:solidFill>
+                              <a:latin typeface="Cambria Math" panose="02040503050406030204" pitchFamily="18" charset="0"/>
+                            </a:rPr>
+                          </m:ctrlPr>
+                        </m:sSubPr>
+                        <m:e>
+                          <m:r>
+                            <a:rPr lang="pt-BR" sz="1100" b="0" i="1" smtClean="0">
+                              <a:solidFill>
+                                <a:schemeClr val="tx1"/>
+                              </a:solidFill>
+                              <a:latin typeface="Cambria Math" panose="02040503050406030204" pitchFamily="18" charset="0"/>
+                            </a:rPr>
+                            <m:t>𝑎</m:t>
+                          </m:r>
+                        </m:e>
+                        <m:sub>
+                          <m:r>
+                            <a:rPr lang="pt-BR" sz="1100" b="0" i="1" smtClean="0">
+                              <a:solidFill>
+                                <a:schemeClr val="tx1"/>
+                              </a:solidFill>
+                              <a:latin typeface="Cambria Math" panose="02040503050406030204" pitchFamily="18" charset="0"/>
+                            </a:rPr>
+                            <m:t>3</m:t>
+                          </m:r>
+                        </m:sub>
+                      </m:sSub>
+                      <m:sSub>
+                        <m:sSubPr>
+                          <m:ctrlPr>
+                            <a:rPr lang="pt-BR" sz="1100" b="0" i="1" smtClean="0">
+                              <a:solidFill>
+                                <a:schemeClr val="tx1"/>
+                              </a:solidFill>
+                              <a:latin typeface="Cambria Math" panose="02040503050406030204" pitchFamily="18" charset="0"/>
+                            </a:rPr>
+                          </m:ctrlPr>
+                        </m:sSubPr>
+                        <m:e>
+                          <m:r>
+                            <a:rPr lang="pt-BR" sz="1100" b="0" i="1" smtClean="0">
+                              <a:solidFill>
+                                <a:schemeClr val="tx1"/>
+                              </a:solidFill>
+                              <a:latin typeface="Cambria Math" panose="02040503050406030204" pitchFamily="18" charset="0"/>
+                            </a:rPr>
+                            <m:t>𝜙</m:t>
+                          </m:r>
+                        </m:e>
+                        <m:sub>
+                          <m:r>
+                            <a:rPr lang="pt-BR" sz="1100" b="0" i="1" smtClean="0">
+                              <a:solidFill>
+                                <a:schemeClr val="tx1"/>
+                              </a:solidFill>
+                              <a:latin typeface="Cambria Math" panose="02040503050406030204" pitchFamily="18" charset="0"/>
+                            </a:rPr>
+                            <m:t>3</m:t>
+                          </m:r>
+                        </m:sub>
+                      </m:sSub>
+                      <m:d>
+                        <m:dPr>
+                          <m:ctrlPr>
+                            <a:rPr lang="pt-BR" sz="1100" b="0" i="1" smtClean="0">
+                              <a:solidFill>
+                                <a:schemeClr val="tx1"/>
+                              </a:solidFill>
+                              <a:latin typeface="Cambria Math" panose="02040503050406030204" pitchFamily="18" charset="0"/>
+                            </a:rPr>
+                          </m:ctrlPr>
+                        </m:dPr>
+                        <m:e>
+                          <m:r>
+                            <a:rPr lang="pt-BR" sz="1100" b="1" i="1" smtClean="0">
+                              <a:solidFill>
+                                <a:schemeClr val="tx1"/>
+                              </a:solidFill>
+                              <a:latin typeface="Cambria Math" panose="02040503050406030204" pitchFamily="18" charset="0"/>
+                            </a:rPr>
+                            <m:t>𝒙</m:t>
+                          </m:r>
+                          <m:r>
+                            <a:rPr lang="pt-BR" sz="1100" b="0" i="1" smtClean="0">
+                              <a:solidFill>
+                                <a:schemeClr val="tx1"/>
+                              </a:solidFill>
+                              <a:latin typeface="Cambria Math" panose="02040503050406030204" pitchFamily="18" charset="0"/>
+                            </a:rPr>
+                            <m:t>;</m:t>
+                          </m:r>
+                          <m:sSub>
+                            <m:sSubPr>
+                              <m:ctrlPr>
+                                <a:rPr lang="pt-BR" sz="1100" b="0" i="1" smtClean="0">
+                                  <a:solidFill>
+                                    <a:schemeClr val="tx1"/>
+                                  </a:solidFill>
+                                  <a:latin typeface="Cambria Math" panose="02040503050406030204" pitchFamily="18" charset="0"/>
+                                </a:rPr>
+                              </m:ctrlPr>
+                            </m:sSubPr>
+                            <m:e>
+                              <m:r>
+                                <a:rPr lang="pt-BR" sz="1100" b="1" i="1" smtClean="0">
+                                  <a:solidFill>
+                                    <a:schemeClr val="tx1"/>
+                                  </a:solidFill>
+                                  <a:latin typeface="Cambria Math" panose="02040503050406030204" pitchFamily="18" charset="0"/>
+                                </a:rPr>
+                                <m:t>𝜽</m:t>
+                              </m:r>
+                            </m:e>
+                            <m:sub>
+                              <m:r>
+                                <a:rPr lang="pt-BR" sz="1100" b="0" i="1" smtClean="0">
+                                  <a:solidFill>
+                                    <a:schemeClr val="tx1"/>
+                                  </a:solidFill>
+                                  <a:latin typeface="Cambria Math" panose="02040503050406030204" pitchFamily="18" charset="0"/>
+                                </a:rPr>
+                                <m:t>3</m:t>
+                              </m:r>
+                            </m:sub>
+                          </m:sSub>
+                        </m:e>
+                      </m:d>
+                    </m:oMath>
+                  </m:oMathPara>
+                </a14:m>
+                <a:endParaRPr lang="pt-BR" sz="1100">
+                  <a:solidFill>
+                    <a:schemeClr val="tx1"/>
+                  </a:solidFill>
+                </a:endParaRPr>
+              </a:p>
+            </p:txBody>
+          </p:sp>
+        </mc:Choice>
+        <mc:Fallback>
+          <p:sp>
+            <p:nvSpPr>
+              <p:cNvPr id="71" name="CaixaDeTexto 70">
+                <a:extLst>
+                  <a:ext uri="{FF2B5EF4-FFF2-40B4-BE49-F238E27FC236}">
+                    <a16:creationId xmlns:a16="http://schemas.microsoft.com/office/drawing/2014/main" id="{7B7471DA-0B75-726E-77F2-E82AFEA09C69}"/>
+                  </a:ext>
+                </a:extLst>
+              </p:cNvPr>
+              <p:cNvSpPr txBox="1">
+                <a:spLocks noRot="1" noChangeAspect="1" noMove="1" noResize="1" noEditPoints="1" noAdjustHandles="1" noChangeArrowheads="1" noChangeShapeType="1" noTextEdit="1"/>
+              </p:cNvSpPr>
+              <p:nvPr/>
+            </p:nvSpPr>
+            <p:spPr>
+              <a:xfrm>
+                <a:off x="5614275" y="5248548"/>
+                <a:ext cx="934294" cy="261610"/>
+              </a:xfrm>
+              <a:prstGeom prst="rect">
+                <a:avLst/>
+              </a:prstGeom>
+              <a:blipFill>
+                <a:blip r:embed="rId12"/>
+                <a:stretch>
+                  <a:fillRect b="-4651"/>
+                </a:stretch>
+              </a:blipFill>
+            </p:spPr>
+            <p:txBody>
+              <a:bodyPr/>
+              <a:lstStyle/>
+              <a:p>
+                <a:r>
+                  <a:rPr lang="pt-BR">
+                    <a:noFill/>
+                  </a:rPr>
+                  <a:t> </a:t>
+                </a:r>
+              </a:p>
+            </p:txBody>
+          </p:sp>
+        </mc:Fallback>
+      </mc:AlternateContent>
+      <mc:AlternateContent xmlns:mc="http://schemas.openxmlformats.org/markup-compatibility/2006">
+        <mc:Choice xmlns:a14="http://schemas.microsoft.com/office/drawing/2010/main" Requires="a14">
+          <p:sp>
+            <p:nvSpPr>
+              <p:cNvPr id="78" name="CaixaDeTexto 77">
+                <a:extLst>
+                  <a:ext uri="{FF2B5EF4-FFF2-40B4-BE49-F238E27FC236}">
+                    <a16:creationId xmlns:a16="http://schemas.microsoft.com/office/drawing/2014/main" id="{8C9659A9-6291-FE5A-404E-9B96A62D85AA}"/>
+                  </a:ext>
+                </a:extLst>
+              </p:cNvPr>
+              <p:cNvSpPr txBox="1"/>
+              <p:nvPr/>
+            </p:nvSpPr>
+            <p:spPr>
+              <a:xfrm>
+                <a:off x="4568449" y="5250353"/>
+                <a:ext cx="790601" cy="261610"/>
+              </a:xfrm>
+              <a:prstGeom prst="rect">
+                <a:avLst/>
+              </a:prstGeom>
+              <a:noFill/>
+            </p:spPr>
+            <p:txBody>
+              <a:bodyPr wrap="none" rtlCol="0">
+                <a:spAutoFit/>
+              </a:bodyPr>
+              <a:lstStyle/>
+              <a:p>
+                <a:pPr/>
+                <a14:m>
+                  <m:oMathPara xmlns:m="http://schemas.openxmlformats.org/officeDocument/2006/math">
+                    <m:oMathParaPr>
+                      <m:jc m:val="centerGroup"/>
+                    </m:oMathParaPr>
+                    <m:oMath xmlns:m="http://schemas.openxmlformats.org/officeDocument/2006/math">
+                      <m:sSub>
+                        <m:sSubPr>
+                          <m:ctrlPr>
+                            <a:rPr lang="pt-BR" sz="1100" b="0" i="1" smtClean="0">
+                              <a:solidFill>
+                                <a:schemeClr val="tx1"/>
+                              </a:solidFill>
+                              <a:latin typeface="Cambria Math" panose="02040503050406030204" pitchFamily="18" charset="0"/>
+                            </a:rPr>
+                          </m:ctrlPr>
+                        </m:sSubPr>
+                        <m:e>
+                          <m:r>
+                            <a:rPr lang="pt-BR" sz="1100" b="0" i="1" smtClean="0">
+                              <a:solidFill>
+                                <a:schemeClr val="tx1"/>
+                              </a:solidFill>
+                              <a:latin typeface="Cambria Math" panose="02040503050406030204" pitchFamily="18" charset="0"/>
+                            </a:rPr>
+                            <m:t>𝜙</m:t>
+                          </m:r>
+                        </m:e>
+                        <m:sub>
+                          <m:r>
+                            <a:rPr lang="pt-BR" sz="1100" b="0" i="1" smtClean="0">
+                              <a:solidFill>
+                                <a:schemeClr val="tx1"/>
+                              </a:solidFill>
+                              <a:latin typeface="Cambria Math" panose="02040503050406030204" pitchFamily="18" charset="0"/>
+                            </a:rPr>
+                            <m:t>3</m:t>
+                          </m:r>
+                        </m:sub>
+                      </m:sSub>
+                      <m:d>
+                        <m:dPr>
+                          <m:ctrlPr>
+                            <a:rPr lang="pt-BR" sz="1100" b="0" i="1" smtClean="0">
+                              <a:solidFill>
+                                <a:schemeClr val="tx1"/>
+                              </a:solidFill>
+                              <a:latin typeface="Cambria Math" panose="02040503050406030204" pitchFamily="18" charset="0"/>
+                            </a:rPr>
+                          </m:ctrlPr>
+                        </m:dPr>
+                        <m:e>
+                          <m:r>
+                            <a:rPr lang="pt-BR" sz="1100" b="1" i="1" smtClean="0">
+                              <a:solidFill>
+                                <a:schemeClr val="tx1"/>
+                              </a:solidFill>
+                              <a:latin typeface="Cambria Math" panose="02040503050406030204" pitchFamily="18" charset="0"/>
+                            </a:rPr>
+                            <m:t>𝒙</m:t>
+                          </m:r>
+                          <m:r>
+                            <a:rPr lang="pt-BR" sz="1100" b="0" i="1" smtClean="0">
+                              <a:solidFill>
+                                <a:schemeClr val="tx1"/>
+                              </a:solidFill>
+                              <a:latin typeface="Cambria Math" panose="02040503050406030204" pitchFamily="18" charset="0"/>
+                            </a:rPr>
+                            <m:t>;</m:t>
+                          </m:r>
+                          <m:sSub>
+                            <m:sSubPr>
+                              <m:ctrlPr>
+                                <a:rPr lang="pt-BR" sz="1100" b="0" i="1" smtClean="0">
+                                  <a:solidFill>
+                                    <a:schemeClr val="tx1"/>
+                                  </a:solidFill>
+                                  <a:latin typeface="Cambria Math" panose="02040503050406030204" pitchFamily="18" charset="0"/>
+                                </a:rPr>
+                              </m:ctrlPr>
+                            </m:sSubPr>
+                            <m:e>
+                              <m:r>
+                                <a:rPr lang="pt-BR" sz="1100" b="1" i="1" smtClean="0">
+                                  <a:solidFill>
+                                    <a:schemeClr val="tx1"/>
+                                  </a:solidFill>
+                                  <a:latin typeface="Cambria Math" panose="02040503050406030204" pitchFamily="18" charset="0"/>
+                                </a:rPr>
+                                <m:t>𝜽</m:t>
+                              </m:r>
+                            </m:e>
+                            <m:sub>
+                              <m:r>
+                                <a:rPr lang="pt-BR" sz="1100" b="0" i="1" smtClean="0">
+                                  <a:solidFill>
+                                    <a:schemeClr val="tx1"/>
+                                  </a:solidFill>
+                                  <a:latin typeface="Cambria Math" panose="02040503050406030204" pitchFamily="18" charset="0"/>
+                                </a:rPr>
+                                <m:t>3</m:t>
+                              </m:r>
+                            </m:sub>
+                          </m:sSub>
+                        </m:e>
+                      </m:d>
+                    </m:oMath>
+                  </m:oMathPara>
+                </a14:m>
+                <a:endParaRPr lang="pt-BR" sz="1100">
+                  <a:solidFill>
+                    <a:schemeClr val="tx1"/>
+                  </a:solidFill>
+                </a:endParaRPr>
+              </a:p>
+            </p:txBody>
+          </p:sp>
+        </mc:Choice>
+        <mc:Fallback>
+          <p:sp>
+            <p:nvSpPr>
+              <p:cNvPr id="78" name="CaixaDeTexto 77">
+                <a:extLst>
+                  <a:ext uri="{FF2B5EF4-FFF2-40B4-BE49-F238E27FC236}">
+                    <a16:creationId xmlns:a16="http://schemas.microsoft.com/office/drawing/2014/main" id="{8C9659A9-6291-FE5A-404E-9B96A62D85AA}"/>
+                  </a:ext>
+                </a:extLst>
+              </p:cNvPr>
+              <p:cNvSpPr txBox="1">
+                <a:spLocks noRot="1" noChangeAspect="1" noMove="1" noResize="1" noEditPoints="1" noAdjustHandles="1" noChangeArrowheads="1" noChangeShapeType="1" noTextEdit="1"/>
+              </p:cNvSpPr>
+              <p:nvPr/>
+            </p:nvSpPr>
+            <p:spPr>
+              <a:xfrm>
+                <a:off x="4568449" y="5250353"/>
+                <a:ext cx="790601" cy="261610"/>
+              </a:xfrm>
+              <a:prstGeom prst="rect">
+                <a:avLst/>
+              </a:prstGeom>
+              <a:blipFill>
+                <a:blip r:embed="rId13"/>
+                <a:stretch>
+                  <a:fillRect b="-6977"/>
+                </a:stretch>
+              </a:blipFill>
+            </p:spPr>
+            <p:txBody>
+              <a:bodyPr/>
+              <a:lstStyle/>
+              <a:p>
+                <a:r>
+                  <a:rPr lang="pt-BR">
+                    <a:noFill/>
+                  </a:rPr>
+                  <a:t> </a:t>
+                </a:r>
+              </a:p>
+            </p:txBody>
+          </p:sp>
+        </mc:Fallback>
+      </mc:AlternateContent>
+    </p:spTree>
+    <p:extLst>
+      <p:ext uri="{BB962C8B-B14F-4D97-AF65-F5344CB8AC3E}">
+        <p14:creationId xmlns:p14="http://schemas.microsoft.com/office/powerpoint/2010/main" val="3173821216"/>
       </p:ext>
     </p:extLst>
   </p:cSld>

</xml_diff>